<commit_message>
Avancées pour la soutenance
</commit_message>
<xml_diff>
--- a/evaluation/P7_Presentation.pptx
+++ b/evaluation/P7_Presentation.pptx
@@ -24,14 +24,15 @@
     <p:sldId id="388" r:id="rId21"/>
     <p:sldId id="389" r:id="rId22"/>
     <p:sldId id="390" r:id="rId23"/>
-    <p:sldId id="386" r:id="rId24"/>
-    <p:sldId id="385" r:id="rId25"/>
-    <p:sldId id="312" r:id="rId26"/>
+    <p:sldId id="393" r:id="rId24"/>
+    <p:sldId id="386" r:id="rId25"/>
+    <p:sldId id="385" r:id="rId26"/>
+    <p:sldId id="312" r:id="rId27"/>
   </p:sldIdLst>
   <p:sldSz cx="12192000" cy="6858000"/>
   <p:notesSz cx="6858000" cy="9144000"/>
   <p:custDataLst>
-    <p:tags r:id="rId27"/>
+    <p:tags r:id="rId28"/>
   </p:custDataLst>
   <p:defaultTextStyle>
     <a:defPPr>
@@ -5940,7 +5941,7 @@
           <a:graphicData uri="http://schemas.openxmlformats.org/presentationml/2006/ole">
             <mc:AlternateContent xmlns:mc="http://schemas.openxmlformats.org/markup-compatibility/2006">
               <mc:Choice xmlns:v="urn:schemas-microsoft-com:vml" Requires="v">
-                <p:oleObj spid="_x0000_s1061" name="Diapositive think-cell" r:id="rId15" imgW="415" imgH="416" progId="TCLayout.ActiveDocument.1">
+                <p:oleObj spid="_x0000_s1066" name="Diapositive think-cell" r:id="rId15" imgW="415" imgH="416" progId="TCLayout.ActiveDocument.1">
                   <p:embed/>
                 </p:oleObj>
               </mc:Choice>
@@ -7226,7 +7227,7 @@
           <a:graphicData uri="http://schemas.openxmlformats.org/presentationml/2006/ole">
             <mc:AlternateContent xmlns:mc="http://schemas.openxmlformats.org/markup-compatibility/2006">
               <mc:Choice xmlns:v="urn:schemas-microsoft-com:vml" Requires="v">
-                <p:oleObj spid="_x0000_s33834" name="Diapositive think-cell" r:id="rId4" imgW="415" imgH="416" progId="TCLayout.ActiveDocument.1">
+                <p:oleObj spid="_x0000_s33839" name="Diapositive think-cell" r:id="rId4" imgW="415" imgH="416" progId="TCLayout.ActiveDocument.1">
                   <p:embed/>
                 </p:oleObj>
               </mc:Choice>
@@ -10234,7 +10235,7 @@
           <a:graphicData uri="http://schemas.openxmlformats.org/presentationml/2006/ole">
             <mc:AlternateContent xmlns:mc="http://schemas.openxmlformats.org/markup-compatibility/2006">
               <mc:Choice xmlns:v="urn:schemas-microsoft-com:vml" Requires="v">
-                <p:oleObj spid="_x0000_s34845" name="Diapositive think-cell" r:id="rId4" imgW="415" imgH="416" progId="TCLayout.ActiveDocument.1">
+                <p:oleObj spid="_x0000_s34851" name="Diapositive think-cell" r:id="rId4" imgW="415" imgH="416" progId="TCLayout.ActiveDocument.1">
                   <p:embed/>
                 </p:oleObj>
               </mc:Choice>
@@ -11282,10 +11283,10 @@
       </p:sp>
       <p:sp>
         <p:nvSpPr>
-          <p:cNvPr id="66" name="Rectangle : coins arrondis 65">
-            <a:extLst>
-              <a:ext uri="{FF2B5EF4-FFF2-40B4-BE49-F238E27FC236}">
-                <a16:creationId xmlns:a16="http://schemas.microsoft.com/office/drawing/2014/main" id="{53B95B14-FE81-4C93-A983-7567F9FC4647}"/>
+          <p:cNvPr id="67" name="Rectangle : coins arrondis 66">
+            <a:extLst>
+              <a:ext uri="{FF2B5EF4-FFF2-40B4-BE49-F238E27FC236}">
+                <a16:creationId xmlns:a16="http://schemas.microsoft.com/office/drawing/2014/main" id="{F5551D15-880B-4177-BEAA-040FB07176A7}"/>
               </a:ext>
             </a:extLst>
           </p:cNvPr>
@@ -11294,92 +11295,8 @@
         </p:nvSpPr>
         <p:spPr>
           <a:xfrm>
-            <a:off x="817391" y="1692436"/>
-            <a:ext cx="2654459" cy="1426398"/>
-          </a:xfrm>
-          <a:prstGeom prst="roundRect">
-            <a:avLst/>
-          </a:prstGeom>
-          <a:solidFill>
-            <a:schemeClr val="bg1">
-              <a:lumMod val="95000"/>
-            </a:schemeClr>
-          </a:solidFill>
-          <a:ln>
-            <a:solidFill>
-              <a:schemeClr val="bg1">
-                <a:lumMod val="95000"/>
-              </a:schemeClr>
-            </a:solidFill>
-          </a:ln>
-          <a:effectLst>
-            <a:outerShdw blurRad="50800" dist="38100" dir="2700000" algn="tl" rotWithShape="0">
-              <a:prstClr val="black">
-                <a:alpha val="40000"/>
-              </a:prstClr>
-            </a:outerShdw>
-          </a:effectLst>
-        </p:spPr>
-        <p:style>
-          <a:lnRef idx="2">
-            <a:schemeClr val="accent1">
-              <a:shade val="50000"/>
-            </a:schemeClr>
-          </a:lnRef>
-          <a:fillRef idx="1">
-            <a:schemeClr val="accent1"/>
-          </a:fillRef>
-          <a:effectRef idx="0">
-            <a:schemeClr val="accent1"/>
-          </a:effectRef>
-          <a:fontRef idx="minor">
-            <a:schemeClr val="lt1"/>
-          </a:fontRef>
-        </p:style>
-        <p:txBody>
-          <a:bodyPr lIns="36000" tIns="0" rIns="36000" bIns="0" rtlCol="0" anchor="ctr"/>
-          <a:lstStyle/>
-          <a:p>
-            <a:pPr algn="ctr"/>
-            <a:r>
-              <a:rPr lang="fr-FR" b="1" dirty="0">
-                <a:solidFill>
-                  <a:schemeClr val="bg1">
-                    <a:lumMod val="85000"/>
-                  </a:schemeClr>
-                </a:solidFill>
-              </a:rPr>
-              <a:t>Entrainement sur training réduit </a:t>
-            </a:r>
-            <a:r>
-              <a:rPr lang="fr-FR" dirty="0">
-                <a:solidFill>
-                  <a:schemeClr val="bg1">
-                    <a:lumMod val="85000"/>
-                  </a:schemeClr>
-                </a:solidFill>
-              </a:rPr>
-              <a:t>avec cross validation et optimisation des hyperparamètres</a:t>
-            </a:r>
-          </a:p>
-        </p:txBody>
-      </p:sp>
-      <p:sp>
-        <p:nvSpPr>
-          <p:cNvPr id="67" name="Rectangle : coins arrondis 66">
-            <a:extLst>
-              <a:ext uri="{FF2B5EF4-FFF2-40B4-BE49-F238E27FC236}">
-                <a16:creationId xmlns:a16="http://schemas.microsoft.com/office/drawing/2014/main" id="{F5551D15-880B-4177-BEAA-040FB07176A7}"/>
-              </a:ext>
-            </a:extLst>
-          </p:cNvPr>
-          <p:cNvSpPr/>
-          <p:nvPr/>
-        </p:nvSpPr>
-        <p:spPr>
-          <a:xfrm>
-            <a:off x="3601732" y="1675304"/>
-            <a:ext cx="2654459" cy="1426398"/>
+            <a:off x="863600" y="1675304"/>
+            <a:ext cx="3538338" cy="1426398"/>
           </a:xfrm>
           <a:prstGeom prst="roundRect">
             <a:avLst/>
@@ -11468,8 +11385,8 @@
         </p:nvSpPr>
         <p:spPr>
           <a:xfrm>
-            <a:off x="6386073" y="1675304"/>
-            <a:ext cx="2654459" cy="1426398"/>
+            <a:off x="4575068" y="1675304"/>
+            <a:ext cx="3538338" cy="1426398"/>
           </a:xfrm>
           <a:prstGeom prst="roundRect">
             <a:avLst/>
@@ -11550,8 +11467,8 @@
         </p:nvSpPr>
         <p:spPr>
           <a:xfrm>
-            <a:off x="9170414" y="1675304"/>
-            <a:ext cx="2654459" cy="1426398"/>
+            <a:off x="8286535" y="1675304"/>
+            <a:ext cx="3538338" cy="1426398"/>
           </a:xfrm>
           <a:prstGeom prst="roundRect">
             <a:avLst/>
@@ -11612,10 +11529,10 @@
       </p:sp>
       <p:sp>
         <p:nvSpPr>
-          <p:cNvPr id="104" name="Rectangle : coins arrondis 103">
-            <a:extLst>
-              <a:ext uri="{FF2B5EF4-FFF2-40B4-BE49-F238E27FC236}">
-                <a16:creationId xmlns:a16="http://schemas.microsoft.com/office/drawing/2014/main" id="{EAB334AA-3778-425D-9743-1DC908CCD7C3}"/>
+          <p:cNvPr id="105" name="Rectangle : coins arrondis 104">
+            <a:extLst>
+              <a:ext uri="{FF2B5EF4-FFF2-40B4-BE49-F238E27FC236}">
+                <a16:creationId xmlns:a16="http://schemas.microsoft.com/office/drawing/2014/main" id="{FBD90510-1D9C-4637-8FB1-FB6BA6F02203}"/>
               </a:ext>
             </a:extLst>
           </p:cNvPr>
@@ -11624,112 +11541,8 @@
         </p:nvSpPr>
         <p:spPr>
           <a:xfrm>
-            <a:off x="817391" y="3234332"/>
-            <a:ext cx="2654459" cy="1426398"/>
-          </a:xfrm>
-          <a:prstGeom prst="roundRect">
-            <a:avLst/>
-          </a:prstGeom>
-          <a:solidFill>
-            <a:schemeClr val="bg1">
-              <a:lumMod val="95000"/>
-            </a:schemeClr>
-          </a:solidFill>
-          <a:ln>
-            <a:solidFill>
-              <a:schemeClr val="bg1">
-                <a:lumMod val="95000"/>
-              </a:schemeClr>
-            </a:solidFill>
-          </a:ln>
-          <a:effectLst>
-            <a:outerShdw blurRad="50800" dist="38100" dir="2700000" algn="tl" rotWithShape="0">
-              <a:prstClr val="black">
-                <a:alpha val="40000"/>
-              </a:prstClr>
-            </a:outerShdw>
-          </a:effectLst>
-        </p:spPr>
-        <p:style>
-          <a:lnRef idx="2">
-            <a:schemeClr val="accent1">
-              <a:shade val="50000"/>
-            </a:schemeClr>
-          </a:lnRef>
-          <a:fillRef idx="1">
-            <a:schemeClr val="accent1"/>
-          </a:fillRef>
-          <a:effectRef idx="0">
-            <a:schemeClr val="accent1"/>
-          </a:effectRef>
-          <a:fontRef idx="minor">
-            <a:schemeClr val="lt1"/>
-          </a:fontRef>
-        </p:style>
-        <p:txBody>
-          <a:bodyPr lIns="36000" tIns="0" rIns="36000" bIns="0" rtlCol="0" anchor="ctr"/>
-          <a:lstStyle/>
-          <a:p>
-            <a:pPr algn="ctr"/>
-            <a:r>
-              <a:rPr lang="fr-FR" dirty="0">
-                <a:solidFill>
-                  <a:schemeClr val="bg1">
-                    <a:lumMod val="85000"/>
-                  </a:schemeClr>
-                </a:solidFill>
-              </a:rPr>
-              <a:t>Sélectionner l’approche pour </a:t>
-            </a:r>
-            <a:r>
-              <a:rPr lang="fr-FR" b="1" dirty="0">
-                <a:solidFill>
-                  <a:schemeClr val="bg1">
-                    <a:lumMod val="85000"/>
-                  </a:schemeClr>
-                </a:solidFill>
-              </a:rPr>
-              <a:t>solutionner la problématique </a:t>
-            </a:r>
-            <a:r>
-              <a:rPr lang="fr-FR" dirty="0">
-                <a:solidFill>
-                  <a:schemeClr val="bg1">
-                    <a:lumMod val="85000"/>
-                  </a:schemeClr>
-                </a:solidFill>
-              </a:rPr>
-              <a:t>du </a:t>
-            </a:r>
-            <a:r>
-              <a:rPr lang="fr-FR" b="1" dirty="0">
-                <a:solidFill>
-                  <a:schemeClr val="bg1">
-                    <a:lumMod val="85000"/>
-                  </a:schemeClr>
-                </a:solidFill>
-              </a:rPr>
-              <a:t>déséquilibre entre les classes</a:t>
-            </a:r>
-          </a:p>
-        </p:txBody>
-      </p:sp>
-      <p:sp>
-        <p:nvSpPr>
-          <p:cNvPr id="105" name="Rectangle : coins arrondis 104">
-            <a:extLst>
-              <a:ext uri="{FF2B5EF4-FFF2-40B4-BE49-F238E27FC236}">
-                <a16:creationId xmlns:a16="http://schemas.microsoft.com/office/drawing/2014/main" id="{FBD90510-1D9C-4637-8FB1-FB6BA6F02203}"/>
-              </a:ext>
-            </a:extLst>
-          </p:cNvPr>
-          <p:cNvSpPr/>
-          <p:nvPr/>
-        </p:nvSpPr>
-        <p:spPr>
-          <a:xfrm>
-            <a:off x="3601732" y="3217198"/>
-            <a:ext cx="2654459" cy="1426398"/>
+            <a:off x="863600" y="3217198"/>
+            <a:ext cx="3538338" cy="1426398"/>
           </a:xfrm>
           <a:prstGeom prst="roundRect">
             <a:avLst/>
@@ -11802,8 +11615,8 @@
         </p:nvSpPr>
         <p:spPr>
           <a:xfrm>
-            <a:off x="6386073" y="3217199"/>
-            <a:ext cx="2654459" cy="1426398"/>
+            <a:off x="4575068" y="3217199"/>
+            <a:ext cx="3538338" cy="1426398"/>
           </a:xfrm>
           <a:prstGeom prst="roundRect">
             <a:avLst/>
@@ -11876,8 +11689,8 @@
         </p:nvSpPr>
         <p:spPr>
           <a:xfrm>
-            <a:off x="9170414" y="3217199"/>
-            <a:ext cx="2654459" cy="1426398"/>
+            <a:off x="8286535" y="3217199"/>
+            <a:ext cx="3538338" cy="1426398"/>
           </a:xfrm>
           <a:prstGeom prst="roundRect">
             <a:avLst/>
@@ -11938,10 +11751,10 @@
       </p:sp>
       <p:sp>
         <p:nvSpPr>
-          <p:cNvPr id="108" name="Rectangle : coins arrondis 107">
-            <a:extLst>
-              <a:ext uri="{FF2B5EF4-FFF2-40B4-BE49-F238E27FC236}">
-                <a16:creationId xmlns:a16="http://schemas.microsoft.com/office/drawing/2014/main" id="{91FFB5F0-9642-4731-8C9B-E78DC8245269}"/>
+          <p:cNvPr id="109" name="Rectangle : coins arrondis 108">
+            <a:extLst>
+              <a:ext uri="{FF2B5EF4-FFF2-40B4-BE49-F238E27FC236}">
+                <a16:creationId xmlns:a16="http://schemas.microsoft.com/office/drawing/2014/main" id="{7728649F-C4C7-4991-86E0-03849BF16218}"/>
               </a:ext>
             </a:extLst>
           </p:cNvPr>
@@ -11950,121 +11763,8 @@
         </p:nvSpPr>
         <p:spPr>
           <a:xfrm>
-            <a:off x="817391" y="4833677"/>
-            <a:ext cx="2654459" cy="1426398"/>
-          </a:xfrm>
-          <a:prstGeom prst="roundRect">
-            <a:avLst/>
-          </a:prstGeom>
-          <a:solidFill>
-            <a:schemeClr val="bg1">
-              <a:lumMod val="95000"/>
-            </a:schemeClr>
-          </a:solidFill>
-          <a:ln>
-            <a:solidFill>
-              <a:schemeClr val="bg1">
-                <a:lumMod val="95000"/>
-              </a:schemeClr>
-            </a:solidFill>
-          </a:ln>
-          <a:effectLst>
-            <a:outerShdw blurRad="50800" dist="38100" dir="2700000" algn="tl" rotWithShape="0">
-              <a:prstClr val="black">
-                <a:alpha val="40000"/>
-              </a:prstClr>
-            </a:outerShdw>
-          </a:effectLst>
-        </p:spPr>
-        <p:style>
-          <a:lnRef idx="2">
-            <a:schemeClr val="accent1">
-              <a:shade val="50000"/>
-            </a:schemeClr>
-          </a:lnRef>
-          <a:fillRef idx="1">
-            <a:schemeClr val="accent1"/>
-          </a:fillRef>
-          <a:effectRef idx="0">
-            <a:schemeClr val="accent1"/>
-          </a:effectRef>
-          <a:fontRef idx="minor">
-            <a:schemeClr val="lt1"/>
-          </a:fontRef>
-        </p:style>
-        <p:txBody>
-          <a:bodyPr lIns="36000" tIns="0" rIns="36000" bIns="0" rtlCol="0" anchor="ctr"/>
-          <a:lstStyle/>
-          <a:p>
-            <a:pPr marL="285750" indent="-285750">
-              <a:buFont typeface="Arial" panose="020B0604020202020204" pitchFamily="34" charset="0"/>
-              <a:buChar char="•"/>
-            </a:pPr>
-            <a:r>
-              <a:rPr lang="fr-FR" b="1" i="1" dirty="0">
-                <a:solidFill>
-                  <a:schemeClr val="bg1">
-                    <a:lumMod val="85000"/>
-                  </a:schemeClr>
-                </a:solidFill>
-              </a:rPr>
-              <a:t>Pondération des observations </a:t>
-            </a:r>
-            <a:r>
-              <a:rPr lang="fr-FR" i="1" dirty="0">
-                <a:solidFill>
-                  <a:schemeClr val="bg1">
-                    <a:lumMod val="85000"/>
-                  </a:schemeClr>
-                </a:solidFill>
-              </a:rPr>
-              <a:t>dans le training</a:t>
-            </a:r>
-          </a:p>
-          <a:p>
-            <a:pPr marL="285750" indent="-285750">
-              <a:buFont typeface="Arial" panose="020B0604020202020204" pitchFamily="34" charset="0"/>
-              <a:buChar char="•"/>
-            </a:pPr>
-            <a:r>
-              <a:rPr lang="fr-FR" i="1" dirty="0">
-                <a:solidFill>
-                  <a:schemeClr val="bg1">
-                    <a:lumMod val="85000"/>
-                  </a:schemeClr>
-                </a:solidFill>
-              </a:rPr>
-              <a:t>Choix d’une </a:t>
-            </a:r>
-            <a:r>
-              <a:rPr lang="fr-FR" b="1" i="1" dirty="0">
-                <a:solidFill>
-                  <a:schemeClr val="bg1">
-                    <a:lumMod val="85000"/>
-                  </a:schemeClr>
-                </a:solidFill>
-              </a:rPr>
-              <a:t>métrique de perf. adaptée</a:t>
-            </a:r>
-          </a:p>
-        </p:txBody>
-      </p:sp>
-      <p:sp>
-        <p:nvSpPr>
-          <p:cNvPr id="109" name="Rectangle : coins arrondis 108">
-            <a:extLst>
-              <a:ext uri="{FF2B5EF4-FFF2-40B4-BE49-F238E27FC236}">
-                <a16:creationId xmlns:a16="http://schemas.microsoft.com/office/drawing/2014/main" id="{7728649F-C4C7-4991-86E0-03849BF16218}"/>
-              </a:ext>
-            </a:extLst>
-          </p:cNvPr>
-          <p:cNvSpPr/>
-          <p:nvPr/>
-        </p:nvSpPr>
-        <p:spPr>
-          <a:xfrm>
-            <a:off x="3601732" y="4816544"/>
-            <a:ext cx="2654459" cy="1426398"/>
+            <a:off x="863600" y="4816544"/>
+            <a:ext cx="3538338" cy="1426398"/>
           </a:xfrm>
           <a:prstGeom prst="roundRect">
             <a:avLst/>
@@ -12170,8 +11870,8 @@
         </p:nvSpPr>
         <p:spPr>
           <a:xfrm>
-            <a:off x="6386073" y="4816545"/>
-            <a:ext cx="2654459" cy="1426398"/>
+            <a:off x="4575068" y="4816545"/>
+            <a:ext cx="3538338" cy="1426398"/>
           </a:xfrm>
           <a:prstGeom prst="roundRect">
             <a:avLst/>
@@ -12255,8 +11955,8 @@
         </p:nvSpPr>
         <p:spPr>
           <a:xfrm>
-            <a:off x="9170414" y="4816545"/>
-            <a:ext cx="2654459" cy="1426398"/>
+            <a:off x="8286535" y="4816545"/>
+            <a:ext cx="3538338" cy="1426398"/>
           </a:xfrm>
           <a:prstGeom prst="roundRect">
             <a:avLst/>
@@ -12699,7 +12399,7 @@
           <a:graphicData uri="http://schemas.openxmlformats.org/presentationml/2006/ole">
             <mc:AlternateContent xmlns:mc="http://schemas.openxmlformats.org/markup-compatibility/2006">
               <mc:Choice xmlns:v="urn:schemas-microsoft-com:vml" Requires="v">
-                <p:oleObj spid="_x0000_s36891" name="Diapositive think-cell" r:id="rId4" imgW="415" imgH="416" progId="TCLayout.ActiveDocument.1">
+                <p:oleObj spid="_x0000_s36897" name="Diapositive think-cell" r:id="rId4" imgW="415" imgH="416" progId="TCLayout.ActiveDocument.1">
                   <p:embed/>
                 </p:oleObj>
               </mc:Choice>
@@ -13767,8 +13467,8 @@
         </p:blipFill>
         <p:spPr>
           <a:xfrm>
-            <a:off x="601028" y="1723165"/>
-            <a:ext cx="3959265" cy="612000"/>
+            <a:off x="1641978" y="1457135"/>
+            <a:ext cx="3726367" cy="576000"/>
           </a:xfrm>
           <a:prstGeom prst="rect">
             <a:avLst/>
@@ -13789,7 +13489,7 @@
         </p:nvCxnSpPr>
         <p:spPr>
           <a:xfrm>
-            <a:off x="4851458" y="1529315"/>
+            <a:off x="7432098" y="1529315"/>
             <a:ext cx="0" cy="4896000"/>
           </a:xfrm>
           <a:prstGeom prst="line">
@@ -13830,7 +13530,7 @@
         </p:nvCxnSpPr>
         <p:spPr>
           <a:xfrm>
-            <a:off x="4900775" y="1529315"/>
+            <a:off x="7481415" y="1529315"/>
             <a:ext cx="0" cy="4896000"/>
           </a:xfrm>
           <a:prstGeom prst="line">
@@ -13871,8 +13571,8 @@
         </p:nvSpPr>
         <p:spPr>
           <a:xfrm>
-            <a:off x="430458" y="2478841"/>
-            <a:ext cx="4266273" cy="3731954"/>
+            <a:off x="218022" y="2040701"/>
+            <a:ext cx="7104972" cy="4589699"/>
           </a:xfrm>
           <a:prstGeom prst="roundRect">
             <a:avLst>
@@ -13919,52 +13619,6 @@
                   <a:srgbClr val="2A0068"/>
                 </a:solidFill>
               </a:rPr>
-              <a:t>On cherche à </a:t>
-            </a:r>
-            <a:r>
-              <a:rPr lang="fr-FR" b="1" dirty="0">
-                <a:solidFill>
-                  <a:srgbClr val="2A0068"/>
-                </a:solidFill>
-              </a:rPr>
-              <a:t>prédire le taux de faux négatifs </a:t>
-            </a:r>
-            <a:r>
-              <a:rPr lang="fr-FR" dirty="0">
-                <a:solidFill>
-                  <a:srgbClr val="2A0068"/>
-                </a:solidFill>
-              </a:rPr>
-              <a:t>en tout premier lieu et </a:t>
-            </a:r>
-            <a:r>
-              <a:rPr lang="fr-FR" b="1" dirty="0">
-                <a:solidFill>
-                  <a:srgbClr val="2A0068"/>
-                </a:solidFill>
-              </a:rPr>
-              <a:t>les faux positifs </a:t>
-            </a:r>
-            <a:r>
-              <a:rPr lang="fr-FR" dirty="0">
-                <a:solidFill>
-                  <a:srgbClr val="2A0068"/>
-                </a:solidFill>
-              </a:rPr>
-              <a:t>en second lieu </a:t>
-            </a:r>
-          </a:p>
-          <a:p>
-            <a:pPr marL="82550" indent="-82550">
-              <a:buFont typeface="Arial" panose="020B0604020202020204" pitchFamily="34" charset="0"/>
-              <a:buChar char="•"/>
-            </a:pPr>
-            <a:r>
-              <a:rPr lang="fr-FR" dirty="0">
-                <a:solidFill>
-                  <a:srgbClr val="2A0068"/>
-                </a:solidFill>
-              </a:rPr>
               <a:t>On cherche donc un </a:t>
             </a:r>
             <a:r>
@@ -13989,24 +13643,18 @@
                   <a:srgbClr val="2A0068"/>
                 </a:solidFill>
               </a:rPr>
-              <a:t>peut se formaliser dans le score F-bêta</a:t>
-            </a:r>
-          </a:p>
-          <a:p>
-            <a:pPr marL="82550" indent="-82550">
-              <a:buFont typeface="Arial" panose="020B0604020202020204" pitchFamily="34" charset="0"/>
-              <a:buChar char="•"/>
-            </a:pPr>
-            <a:r>
-              <a:rPr lang="fr-FR" dirty="0">
+              <a:t>peut se formaliser dans le score F-bêta </a:t>
+            </a:r>
+            <a:r>
+              <a:rPr lang="fr-FR" sz="1200" i="1" dirty="0">
                 <a:solidFill>
                   <a:srgbClr val="2A0068"/>
                 </a:solidFill>
               </a:rPr>
-              <a:t>Il s’agit de la </a:t>
-            </a:r>
-            <a:r>
-              <a:rPr lang="fr-FR" b="1" dirty="0">
+              <a:t>(il s’agit de la </a:t>
+            </a:r>
+            <a:r>
+              <a:rPr lang="fr-FR" sz="1200" b="1" i="1" dirty="0">
                 <a:solidFill>
                   <a:srgbClr val="2A0068"/>
                 </a:solidFill>
@@ -14014,12 +13662,12 @@
               <a:t>moyenne harmonique pondérée de la précision et du rappel</a:t>
             </a:r>
             <a:r>
-              <a:rPr lang="fr-FR" dirty="0">
+              <a:rPr lang="fr-FR" sz="1200" i="1" dirty="0">
                 <a:solidFill>
                   <a:srgbClr val="2A0068"/>
                 </a:solidFill>
               </a:rPr>
-              <a:t>, atteignant sa valeur optimale à 1 et sa pire valeur à 0</a:t>
+              <a:t>, atteignant sa valeur optimale à 1 et sa pire valeur à 0)</a:t>
             </a:r>
           </a:p>
           <a:p>
@@ -14041,26 +13689,266 @@
                   <a:srgbClr val="2A0068"/>
                 </a:solidFill>
               </a:rPr>
-              <a:t>paramètre beta détermine le poids du rappel dans le score combiné ; p</a:t>
-            </a:r>
-            <a:r>
-              <a:rPr lang="fr-FR" b="1" i="0" dirty="0">
+              <a:t>paramètre beta détermine le poids du rappel dans le score combiné </a:t>
+            </a:r>
+            <a:r>
+              <a:rPr lang="fr-FR" sz="1200" b="1" i="1" dirty="0">
+                <a:solidFill>
+                  <a:srgbClr val="2A0068"/>
+                </a:solidFill>
+              </a:rPr>
+              <a:t>(p</a:t>
+            </a:r>
+            <a:r>
+              <a:rPr lang="fr-FR" sz="1200" b="1" i="1" dirty="0">
                 <a:solidFill>
                   <a:srgbClr val="2A0068"/>
                 </a:solidFill>
                 <a:effectLst/>
               </a:rPr>
-              <a:t>our β≥1, on accorde plus d’importance au recall </a:t>
-            </a:r>
-            <a:r>
-              <a:rPr lang="fr-FR" i="0" dirty="0">
+              <a:t>our β≥1, on accorde plus d’importance au recall, </a:t>
+            </a:r>
+            <a:r>
+              <a:rPr lang="fr-FR" sz="1200" i="1" dirty="0">
                 <a:solidFill>
                   <a:srgbClr val="2A0068"/>
                 </a:solidFill>
                 <a:effectLst/>
               </a:rPr>
-              <a:t>(autrement dit aux faux négatifs)</a:t>
-            </a:r>
+              <a:t>autrement dit aux faux négatifs)</a:t>
+            </a:r>
+          </a:p>
+          <a:p>
+            <a:pPr marL="82550" indent="-82550">
+              <a:buFont typeface="Arial" panose="020B0604020202020204" pitchFamily="34" charset="0"/>
+              <a:buChar char="•"/>
+            </a:pPr>
+            <a:r>
+              <a:rPr lang="fr-FR" dirty="0">
+                <a:solidFill>
+                  <a:srgbClr val="2A0068"/>
+                </a:solidFill>
+                <a:effectLst/>
+                <a:ea typeface="Calibri" panose="020F0502020204030204" pitchFamily="34" charset="0"/>
+                <a:cs typeface="Calibri" panose="020F0502020204030204" pitchFamily="34" charset="0"/>
+              </a:rPr>
+              <a:t>On cherche donc à </a:t>
+            </a:r>
+            <a:r>
+              <a:rPr lang="fr-FR" b="1" dirty="0">
+                <a:solidFill>
+                  <a:srgbClr val="2A0068"/>
+                </a:solidFill>
+                <a:effectLst/>
+                <a:ea typeface="Calibri" panose="020F0502020204030204" pitchFamily="34" charset="0"/>
+                <a:cs typeface="Calibri" panose="020F0502020204030204" pitchFamily="34" charset="0"/>
+              </a:rPr>
+              <a:t>attribuer un « poids » au Beta</a:t>
+            </a:r>
+            <a:r>
+              <a:rPr lang="fr-FR" dirty="0">
+                <a:solidFill>
+                  <a:srgbClr val="2A0068"/>
+                </a:solidFill>
+                <a:effectLst/>
+                <a:ea typeface="Calibri" panose="020F0502020204030204" pitchFamily="34" charset="0"/>
+                <a:cs typeface="Calibri" panose="020F0502020204030204" pitchFamily="34" charset="0"/>
+              </a:rPr>
+              <a:t> ; pour ce faire, il faut estimer d’un point de vue métier sa valeur, via :</a:t>
+            </a:r>
+            <a:r>
+              <a:rPr lang="fr-FR" b="1" dirty="0">
+                <a:solidFill>
+                  <a:srgbClr val="2A0068"/>
+                </a:solidFill>
+                <a:ea typeface="Calibri" panose="020F0502020204030204" pitchFamily="34" charset="0"/>
+                <a:cs typeface="Calibri" panose="020F0502020204030204" pitchFamily="34" charset="0"/>
+              </a:rPr>
+              <a:t> c</a:t>
+            </a:r>
+            <a:r>
+              <a:rPr lang="fr-FR" b="1" dirty="0">
+                <a:solidFill>
+                  <a:srgbClr val="2A0068"/>
+                </a:solidFill>
+                <a:effectLst/>
+                <a:ea typeface="Calibri" panose="020F0502020204030204" pitchFamily="34" charset="0"/>
+                <a:cs typeface="Calibri" panose="020F0502020204030204" pitchFamily="34" charset="0"/>
+              </a:rPr>
+              <a:t>oût moyen du défaut de paiement</a:t>
+            </a:r>
+            <a:r>
+              <a:rPr lang="fr-FR" b="1" dirty="0">
+                <a:solidFill>
+                  <a:srgbClr val="2A0068"/>
+                </a:solidFill>
+                <a:ea typeface="Calibri" panose="020F0502020204030204" pitchFamily="34" charset="0"/>
+                <a:cs typeface="Times New Roman" panose="02020603050405020304" pitchFamily="18" charset="0"/>
+              </a:rPr>
+              <a:t> ET c</a:t>
+            </a:r>
+            <a:r>
+              <a:rPr lang="fr-FR" b="1" dirty="0">
+                <a:solidFill>
+                  <a:srgbClr val="2A0068"/>
+                </a:solidFill>
+                <a:effectLst/>
+                <a:ea typeface="Calibri" panose="020F0502020204030204" pitchFamily="34" charset="0"/>
+                <a:cs typeface="Calibri" panose="020F0502020204030204" pitchFamily="34" charset="0"/>
+              </a:rPr>
+              <a:t>oût d’opportunité d’un client potentiel accidentellement écarté</a:t>
+            </a:r>
+            <a:endParaRPr lang="fr-FR" b="1" dirty="0">
+              <a:solidFill>
+                <a:srgbClr val="2A0068"/>
+              </a:solidFill>
+              <a:effectLst/>
+              <a:ea typeface="Calibri" panose="020F0502020204030204" pitchFamily="34" charset="0"/>
+              <a:cs typeface="Times New Roman" panose="02020603050405020304" pitchFamily="18" charset="0"/>
+            </a:endParaRPr>
+          </a:p>
+          <a:p>
+            <a:pPr marL="85725" indent="-85725" algn="just">
+              <a:buFont typeface="Arial" panose="020B0604020202020204" pitchFamily="34" charset="0"/>
+              <a:buChar char="•"/>
+            </a:pPr>
+            <a:r>
+              <a:rPr lang="fr-FR" dirty="0">
+                <a:solidFill>
+                  <a:srgbClr val="2A0068"/>
+                </a:solidFill>
+                <a:effectLst/>
+                <a:ea typeface="Calibri" panose="020F0502020204030204" pitchFamily="34" charset="0"/>
+                <a:cs typeface="Times New Roman" panose="02020603050405020304" pitchFamily="18" charset="0"/>
+              </a:rPr>
+              <a:t>Nos hypothèses métiers :</a:t>
+            </a:r>
+          </a:p>
+          <a:p>
+            <a:pPr marL="171450" indent="-171450" algn="just">
+              <a:buFontTx/>
+              <a:buChar char="-"/>
+            </a:pPr>
+            <a:r>
+              <a:rPr lang="fr-FR" dirty="0">
+                <a:solidFill>
+                  <a:srgbClr val="2A0068"/>
+                </a:solidFill>
+                <a:effectLst/>
+                <a:ea typeface="Calibri" panose="020F0502020204030204" pitchFamily="34" charset="0"/>
+                <a:cs typeface="Calibri" panose="020F0502020204030204" pitchFamily="34" charset="0"/>
+              </a:rPr>
+              <a:t>Chaque défaut entraine la dépense d’un cinquième du montant du crédit en pertes </a:t>
+            </a:r>
+            <a:r>
+              <a:rPr lang="fr-FR" sz="1200" i="1" dirty="0">
+                <a:solidFill>
+                  <a:srgbClr val="2A0068"/>
+                </a:solidFill>
+                <a:effectLst/>
+                <a:ea typeface="Calibri" panose="020F0502020204030204" pitchFamily="34" charset="0"/>
+                <a:cs typeface="Calibri" panose="020F0502020204030204" pitchFamily="34" charset="0"/>
+              </a:rPr>
+              <a:t>(coefficient recall = 20% x montant moyen du crédit des personnes en défaut de paiement)</a:t>
+            </a:r>
+            <a:endParaRPr lang="fr-FR" sz="1200" i="1" dirty="0">
+              <a:solidFill>
+                <a:srgbClr val="2A0068"/>
+              </a:solidFill>
+              <a:ea typeface="Calibri" panose="020F0502020204030204" pitchFamily="34" charset="0"/>
+              <a:cs typeface="Times New Roman" panose="02020603050405020304" pitchFamily="18" charset="0"/>
+            </a:endParaRPr>
+          </a:p>
+          <a:p>
+            <a:pPr marL="171450" indent="-171450" algn="just">
+              <a:buFontTx/>
+              <a:buChar char="-"/>
+            </a:pPr>
+            <a:r>
+              <a:rPr lang="fr-FR" dirty="0">
+                <a:solidFill>
+                  <a:srgbClr val="2A0068"/>
+                </a:solidFill>
+                <a:effectLst/>
+                <a:ea typeface="Calibri" panose="020F0502020204030204" pitchFamily="34" charset="0"/>
+                <a:cs typeface="Calibri" panose="020F0502020204030204" pitchFamily="34" charset="0"/>
+              </a:rPr>
+              <a:t>Un client a 12% de chance de souscrire au crédit quand il en fait la demande à un conseiller ; le coû</a:t>
+            </a:r>
+            <a:r>
+              <a:rPr lang="fr-FR" dirty="0">
+                <a:solidFill>
+                  <a:srgbClr val="2A0068"/>
+                </a:solidFill>
+                <a:effectLst/>
+                <a:ea typeface="Calibri" panose="020F0502020204030204" pitchFamily="34" charset="0"/>
+                <a:cs typeface="Times New Roman" panose="02020603050405020304" pitchFamily="18" charset="0"/>
+              </a:rPr>
+              <a:t>t</a:t>
+            </a:r>
+            <a:r>
+              <a:rPr lang="fr-FR" dirty="0">
+                <a:solidFill>
+                  <a:srgbClr val="2A0068"/>
+                </a:solidFill>
+                <a:effectLst/>
+                <a:ea typeface="Calibri" panose="020F0502020204030204" pitchFamily="34" charset="0"/>
+                <a:cs typeface="Calibri" panose="020F0502020204030204" pitchFamily="34" charset="0"/>
+              </a:rPr>
+              <a:t> d'opportunité pour un client potentiel accidentellement écarté est de 12% également </a:t>
+            </a:r>
+            <a:r>
+              <a:rPr lang="fr-FR" sz="1200" i="1" dirty="0">
+                <a:solidFill>
+                  <a:srgbClr val="2A0068"/>
+                </a:solidFill>
+                <a:effectLst/>
+                <a:ea typeface="Calibri" panose="020F0502020204030204" pitchFamily="34" charset="0"/>
+                <a:cs typeface="Calibri" panose="020F0502020204030204" pitchFamily="34" charset="0"/>
+              </a:rPr>
+              <a:t>(coefficient précision = 12% x montant moyen du crédit des personnes sans défaut de paiement)</a:t>
+            </a:r>
+            <a:endParaRPr lang="fr-FR" sz="1200" i="1" dirty="0">
+              <a:solidFill>
+                <a:srgbClr val="2A0068"/>
+              </a:solidFill>
+              <a:effectLst/>
+              <a:ea typeface="Calibri" panose="020F0502020204030204" pitchFamily="34" charset="0"/>
+              <a:cs typeface="Times New Roman" panose="02020603050405020304" pitchFamily="18" charset="0"/>
+            </a:endParaRPr>
+          </a:p>
+          <a:p>
+            <a:pPr algn="just"/>
+            <a:r>
+              <a:rPr lang="fr-FR" dirty="0">
+                <a:solidFill>
+                  <a:srgbClr val="2A0068"/>
+                </a:solidFill>
+                <a:effectLst/>
+                <a:ea typeface="Calibri" panose="020F0502020204030204" pitchFamily="34" charset="0"/>
+                <a:cs typeface="Calibri" panose="020F0502020204030204" pitchFamily="34" charset="0"/>
+              </a:rPr>
+              <a:t>On obtient donc : </a:t>
+            </a:r>
+            <a:r>
+              <a:rPr lang="fr-FR" b="1" dirty="0">
+                <a:solidFill>
+                  <a:srgbClr val="2A0068"/>
+                </a:solidFill>
+                <a:effectLst/>
+                <a:ea typeface="Calibri" panose="020F0502020204030204" pitchFamily="34" charset="0"/>
+                <a:cs typeface="Calibri" panose="020F0502020204030204" pitchFamily="34" charset="0"/>
+              </a:rPr>
+              <a:t>Beta = coefficient recall / coefficient précision = 2,7</a:t>
+            </a:r>
+            <a:endParaRPr lang="fr-FR" dirty="0">
+              <a:solidFill>
+                <a:srgbClr val="2A0068"/>
+              </a:solidFill>
+              <a:effectLst/>
+              <a:ea typeface="Calibri" panose="020F0502020204030204" pitchFamily="34" charset="0"/>
+              <a:cs typeface="Times New Roman" panose="02020603050405020304" pitchFamily="18" charset="0"/>
+            </a:endParaRPr>
           </a:p>
         </p:txBody>
       </p:sp>
@@ -14078,7 +13966,7 @@
         </p:nvSpPr>
         <p:spPr>
           <a:xfrm>
-            <a:off x="5139658" y="2854960"/>
+            <a:off x="7649838" y="1618652"/>
             <a:ext cx="1982501" cy="1747520"/>
           </a:xfrm>
           <a:prstGeom prst="rect">
@@ -14135,7 +14023,7 @@
         </p:nvSpPr>
         <p:spPr>
           <a:xfrm>
-            <a:off x="7341326" y="2854960"/>
+            <a:off x="9790760" y="1602100"/>
             <a:ext cx="1982501" cy="1747520"/>
           </a:xfrm>
           <a:prstGeom prst="rect">
@@ -14192,7 +14080,7 @@
         </p:nvSpPr>
         <p:spPr>
           <a:xfrm>
-            <a:off x="9527763" y="2854960"/>
+            <a:off x="8703558" y="4118796"/>
             <a:ext cx="1982501" cy="1747520"/>
           </a:xfrm>
           <a:prstGeom prst="rect">
@@ -14266,7 +14154,7 @@
         </p:blipFill>
         <p:spPr>
           <a:xfrm>
-            <a:off x="10061813" y="2021641"/>
+            <a:off x="9237608" y="3285477"/>
             <a:ext cx="914400" cy="914400"/>
           </a:xfrm>
           <a:prstGeom prst="rect">
@@ -14288,7 +14176,7 @@
         </p:nvSpPr>
         <p:spPr>
           <a:xfrm>
-            <a:off x="5129498" y="2855032"/>
+            <a:off x="7639678" y="1618724"/>
             <a:ext cx="2016000" cy="1764000"/>
           </a:xfrm>
           <a:prstGeom prst="rect">
@@ -14343,7 +14231,7 @@
         </p:nvSpPr>
         <p:spPr>
           <a:xfrm>
-            <a:off x="7341326" y="2855032"/>
+            <a:off x="9790760" y="1602172"/>
             <a:ext cx="2016000" cy="1764000"/>
           </a:xfrm>
           <a:prstGeom prst="rect">
@@ -14929,7 +14817,7 @@
           <a:graphicData uri="http://schemas.openxmlformats.org/presentationml/2006/ole">
             <mc:AlternateContent xmlns:mc="http://schemas.openxmlformats.org/markup-compatibility/2006">
               <mc:Choice xmlns:v="urn:schemas-microsoft-com:vml" Requires="v">
-                <p:oleObj spid="_x0000_s48131" name="Diapositive think-cell" r:id="rId4" imgW="415" imgH="416" progId="TCLayout.ActiveDocument.1">
+                <p:oleObj spid="_x0000_s48136" name="Diapositive think-cell" r:id="rId4" imgW="415" imgH="416" progId="TCLayout.ActiveDocument.1">
                   <p:embed/>
                 </p:oleObj>
               </mc:Choice>
@@ -19445,6 +19333,55 @@
           </a:p>
         </p:txBody>
       </p:sp>
+      <p:sp>
+        <p:nvSpPr>
+          <p:cNvPr id="104" name="Rectangle 103">
+            <a:extLst>
+              <a:ext uri="{FF2B5EF4-FFF2-40B4-BE49-F238E27FC236}">
+                <a16:creationId xmlns:a16="http://schemas.microsoft.com/office/drawing/2014/main" id="{0675B6D0-0F75-47DF-8921-500DE55B8D47}"/>
+              </a:ext>
+            </a:extLst>
+          </p:cNvPr>
+          <p:cNvSpPr/>
+          <p:nvPr/>
+        </p:nvSpPr>
+        <p:spPr>
+          <a:xfrm>
+            <a:off x="1177457" y="2507451"/>
+            <a:ext cx="4917769" cy="2293937"/>
+          </a:xfrm>
+          <a:prstGeom prst="rect">
+            <a:avLst/>
+          </a:prstGeom>
+        </p:spPr>
+        <p:style>
+          <a:lnRef idx="2">
+            <a:schemeClr val="accent1">
+              <a:shade val="50000"/>
+            </a:schemeClr>
+          </a:lnRef>
+          <a:fillRef idx="1">
+            <a:schemeClr val="accent1"/>
+          </a:fillRef>
+          <a:effectRef idx="0">
+            <a:schemeClr val="accent1"/>
+          </a:effectRef>
+          <a:fontRef idx="minor">
+            <a:schemeClr val="lt1"/>
+          </a:fontRef>
+        </p:style>
+        <p:txBody>
+          <a:bodyPr rtlCol="0" anchor="ctr"/>
+          <a:lstStyle/>
+          <a:p>
+            <a:pPr algn="ctr"/>
+            <a:r>
+              <a:rPr lang="fr-FR" dirty="0"/>
+              <a:t>A corriger avec Sabrine</a:t>
+            </a:r>
+          </a:p>
+        </p:txBody>
+      </p:sp>
     </p:spTree>
     <p:extLst>
       <p:ext uri="{BB962C8B-B14F-4D97-AF65-F5344CB8AC3E}">
@@ -19501,7 +19438,7 @@
           <a:graphicData uri="http://schemas.openxmlformats.org/presentationml/2006/ole">
             <mc:AlternateContent xmlns:mc="http://schemas.openxmlformats.org/markup-compatibility/2006">
               <mc:Choice xmlns:v="urn:schemas-microsoft-com:vml" Requires="v">
-                <p:oleObj spid="_x0000_s35868" name="Diapositive think-cell" r:id="rId4" imgW="415" imgH="416" progId="TCLayout.ActiveDocument.1">
+                <p:oleObj spid="_x0000_s35873" name="Diapositive think-cell" r:id="rId4" imgW="415" imgH="416" progId="TCLayout.ActiveDocument.1">
                   <p:embed/>
                 </p:oleObj>
               </mc:Choice>
@@ -20605,7 +20542,7 @@
           <a:graphicData uri="http://schemas.openxmlformats.org/presentationml/2006/ole">
             <mc:AlternateContent xmlns:mc="http://schemas.openxmlformats.org/markup-compatibility/2006">
               <mc:Choice xmlns:v="urn:schemas-microsoft-com:vml" Requires="v">
-                <p:oleObj spid="_x0000_s44036" name="Diapositive think-cell" r:id="rId4" imgW="415" imgH="416" progId="TCLayout.ActiveDocument.1">
+                <p:oleObj spid="_x0000_s44041" name="Diapositive think-cell" r:id="rId4" imgW="415" imgH="416" progId="TCLayout.ActiveDocument.1">
                   <p:embed/>
                 </p:oleObj>
               </mc:Choice>
@@ -20754,10 +20691,10 @@
       </p:sp>
       <p:pic>
         <p:nvPicPr>
-          <p:cNvPr id="3" name="Image 2">
-            <a:extLst>
-              <a:ext uri="{FF2B5EF4-FFF2-40B4-BE49-F238E27FC236}">
-                <a16:creationId xmlns:a16="http://schemas.microsoft.com/office/drawing/2014/main" id="{1CD00AD7-E586-489F-8CCC-9E6704EC2C79}"/>
+          <p:cNvPr id="6" name="Image 5">
+            <a:extLst>
+              <a:ext uri="{FF2B5EF4-FFF2-40B4-BE49-F238E27FC236}">
+                <a16:creationId xmlns:a16="http://schemas.microsoft.com/office/drawing/2014/main" id="{87F4F7BD-B7EB-4A8C-9CFB-1ADF4EC1F186}"/>
               </a:ext>
             </a:extLst>
           </p:cNvPr>
@@ -20774,8 +20711,8 @@
         </p:blipFill>
         <p:spPr>
           <a:xfrm>
-            <a:off x="0" y="567001"/>
-            <a:ext cx="12204000" cy="5711421"/>
+            <a:off x="34613" y="609455"/>
+            <a:ext cx="12122773" cy="5639090"/>
           </a:xfrm>
           <a:prstGeom prst="rect">
             <a:avLst/>
@@ -20830,7 +20767,7 @@
             </p:custDataLst>
             <p:extLst>
               <p:ext uri="{D42A27DB-BD31-4B8C-83A1-F6EECF244321}">
-                <p14:modId xmlns:p14="http://schemas.microsoft.com/office/powerpoint/2010/main" val="4240587722"/>
+                <p14:modId xmlns:p14="http://schemas.microsoft.com/office/powerpoint/2010/main" val="4132998473"/>
               </p:ext>
             </p:extLst>
           </p:nvPr>
@@ -20843,7 +20780,7 @@
           <a:graphicData uri="http://schemas.openxmlformats.org/presentationml/2006/ole">
             <mc:AlternateContent xmlns:mc="http://schemas.openxmlformats.org/markup-compatibility/2006">
               <mc:Choice xmlns:v="urn:schemas-microsoft-com:vml" Requires="v">
-                <p:oleObj spid="_x0000_s45060" name="Diapositive think-cell" r:id="rId4" imgW="415" imgH="416" progId="TCLayout.ActiveDocument.1">
+                <p:oleObj spid="_x0000_s45065" name="Diapositive think-cell" r:id="rId4" imgW="415" imgH="416" progId="TCLayout.ActiveDocument.1">
                   <p:embed/>
                 </p:oleObj>
               </mc:Choice>
@@ -20992,10 +20929,10 @@
       </p:sp>
       <p:pic>
         <p:nvPicPr>
-          <p:cNvPr id="6" name="Image 5">
-            <a:extLst>
-              <a:ext uri="{FF2B5EF4-FFF2-40B4-BE49-F238E27FC236}">
-                <a16:creationId xmlns:a16="http://schemas.microsoft.com/office/drawing/2014/main" id="{726D44A8-83B5-414E-8B3E-38DC3E7783CF}"/>
+          <p:cNvPr id="3" name="Image 2">
+            <a:extLst>
+              <a:ext uri="{FF2B5EF4-FFF2-40B4-BE49-F238E27FC236}">
+                <a16:creationId xmlns:a16="http://schemas.microsoft.com/office/drawing/2014/main" id="{DAA50287-B007-4881-8E03-8AABE559CEEE}"/>
               </a:ext>
             </a:extLst>
           </p:cNvPr>
@@ -21012,8 +20949,8 @@
         </p:blipFill>
         <p:spPr>
           <a:xfrm>
-            <a:off x="25088" y="21805"/>
-            <a:ext cx="12141824" cy="5581937"/>
+            <a:off x="18737" y="83038"/>
+            <a:ext cx="12154525" cy="5696243"/>
           </a:xfrm>
           <a:prstGeom prst="rect">
             <a:avLst/>
@@ -21034,16 +20971,15 @@
           </p:cNvPicPr>
           <p:nvPr/>
         </p:nvPicPr>
-        <p:blipFill>
+        <p:blipFill rotWithShape="1">
           <a:blip r:embed="rId7"/>
-          <a:stretch>
-            <a:fillRect/>
-          </a:stretch>
+          <a:srcRect r="2983" b="22512"/>
+          <a:stretch/>
         </p:blipFill>
         <p:spPr>
           <a:xfrm>
-            <a:off x="2590621" y="3561571"/>
-            <a:ext cx="8770130" cy="3312000"/>
+            <a:off x="2401400" y="3927685"/>
+            <a:ext cx="9803300" cy="2956949"/>
           </a:xfrm>
           <a:prstGeom prst="rect">
             <a:avLst/>
@@ -21106,7 +21042,7 @@
           <a:graphicData uri="http://schemas.openxmlformats.org/presentationml/2006/ole">
             <mc:AlternateContent xmlns:mc="http://schemas.openxmlformats.org/markup-compatibility/2006">
               <mc:Choice xmlns:v="urn:schemas-microsoft-com:vml" Requires="v">
-                <p:oleObj spid="_x0000_s46084" name="Diapositive think-cell" r:id="rId4" imgW="415" imgH="416" progId="TCLayout.ActiveDocument.1">
+                <p:oleObj spid="_x0000_s46089" name="Diapositive think-cell" r:id="rId4" imgW="415" imgH="416" progId="TCLayout.ActiveDocument.1">
                   <p:embed/>
                 </p:oleObj>
               </mc:Choice>
@@ -21253,6 +21189,64 @@
           </a:p>
         </p:txBody>
       </p:sp>
+      <p:pic>
+        <p:nvPicPr>
+          <p:cNvPr id="3" name="Image 2">
+            <a:extLst>
+              <a:ext uri="{FF2B5EF4-FFF2-40B4-BE49-F238E27FC236}">
+                <a16:creationId xmlns:a16="http://schemas.microsoft.com/office/drawing/2014/main" id="{46E26DDF-5DE2-4F11-84D4-E15E23A81365}"/>
+              </a:ext>
+            </a:extLst>
+          </p:cNvPr>
+          <p:cNvPicPr>
+            <a:picLocks noChangeAspect="1"/>
+          </p:cNvPicPr>
+          <p:nvPr/>
+        </p:nvPicPr>
+        <p:blipFill rotWithShape="1">
+          <a:blip r:embed="rId6"/>
+          <a:srcRect b="914"/>
+          <a:stretch/>
+        </p:blipFill>
+        <p:spPr>
+          <a:xfrm>
+            <a:off x="18737" y="18267"/>
+            <a:ext cx="12154525" cy="5732294"/>
+          </a:xfrm>
+          <a:prstGeom prst="rect">
+            <a:avLst/>
+          </a:prstGeom>
+        </p:spPr>
+      </p:pic>
+      <p:pic>
+        <p:nvPicPr>
+          <p:cNvPr id="7" name="Image 6">
+            <a:extLst>
+              <a:ext uri="{FF2B5EF4-FFF2-40B4-BE49-F238E27FC236}">
+                <a16:creationId xmlns:a16="http://schemas.microsoft.com/office/drawing/2014/main" id="{91DE87BA-5528-4793-A567-3779C30DA753}"/>
+              </a:ext>
+            </a:extLst>
+          </p:cNvPr>
+          <p:cNvPicPr>
+            <a:picLocks noChangeAspect="1"/>
+          </p:cNvPicPr>
+          <p:nvPr/>
+        </p:nvPicPr>
+        <p:blipFill rotWithShape="1">
+          <a:blip r:embed="rId7"/>
+          <a:srcRect b="22561"/>
+          <a:stretch/>
+        </p:blipFill>
+        <p:spPr>
+          <a:xfrm>
+            <a:off x="2680732" y="3455634"/>
+            <a:ext cx="8796648" cy="3429000"/>
+          </a:xfrm>
+          <a:prstGeom prst="rect">
+            <a:avLst/>
+          </a:prstGeom>
+        </p:spPr>
+      </p:pic>
     </p:spTree>
     <p:extLst>
       <p:ext uri="{BB962C8B-B14F-4D97-AF65-F5344CB8AC3E}">
@@ -22806,439 +22800,6 @@
           <a:chExt cx="0" cy="0"/>
         </a:xfrm>
       </p:grpSpPr>
-      <p:grpSp>
-        <p:nvGrpSpPr>
-          <p:cNvPr id="30" name="Groupe 29">
-            <a:extLst>
-              <a:ext uri="{FF2B5EF4-FFF2-40B4-BE49-F238E27FC236}">
-                <a16:creationId xmlns:a16="http://schemas.microsoft.com/office/drawing/2014/main" id="{59BC9850-3059-4197-89D4-2CFAB90549F4}"/>
-              </a:ext>
-            </a:extLst>
-          </p:cNvPr>
-          <p:cNvGrpSpPr/>
-          <p:nvPr/>
-        </p:nvGrpSpPr>
-        <p:grpSpPr>
-          <a:xfrm>
-            <a:off x="11274812" y="6548470"/>
-            <a:ext cx="912993" cy="305335"/>
-            <a:chOff x="11274812" y="6548470"/>
-            <a:chExt cx="912993" cy="305335"/>
-          </a:xfrm>
-        </p:grpSpPr>
-        <p:sp>
-          <p:nvSpPr>
-            <p:cNvPr id="31" name="Rectangle 30">
-              <a:extLst>
-                <a:ext uri="{FF2B5EF4-FFF2-40B4-BE49-F238E27FC236}">
-                  <a16:creationId xmlns:a16="http://schemas.microsoft.com/office/drawing/2014/main" id="{AEF1AEA9-D638-41F3-AA23-74E14CCF2900}"/>
-                </a:ext>
-              </a:extLst>
-            </p:cNvPr>
-            <p:cNvSpPr/>
-            <p:nvPr/>
-          </p:nvSpPr>
-          <p:spPr>
-            <a:xfrm>
-              <a:off x="11278998" y="6597836"/>
-              <a:ext cx="908807" cy="255969"/>
-            </a:xfrm>
-            <a:prstGeom prst="rect">
-              <a:avLst/>
-            </a:prstGeom>
-            <a:solidFill>
-              <a:srgbClr val="2A0068"/>
-            </a:solidFill>
-            <a:ln>
-              <a:solidFill>
-                <a:srgbClr val="2A0068"/>
-              </a:solidFill>
-            </a:ln>
-          </p:spPr>
-          <p:style>
-            <a:lnRef idx="2">
-              <a:schemeClr val="accent1">
-                <a:shade val="50000"/>
-              </a:schemeClr>
-            </a:lnRef>
-            <a:fillRef idx="1">
-              <a:schemeClr val="accent1"/>
-            </a:fillRef>
-            <a:effectRef idx="0">
-              <a:schemeClr val="accent1"/>
-            </a:effectRef>
-            <a:fontRef idx="minor">
-              <a:schemeClr val="lt1"/>
-            </a:fontRef>
-          </p:style>
-          <p:txBody>
-            <a:bodyPr rtlCol="0" anchor="ctr"/>
-            <a:lstStyle/>
-            <a:p>
-              <a:pPr algn="ctr"/>
-              <a:endParaRPr lang="fr-FR" dirty="0"/>
-            </a:p>
-          </p:txBody>
-        </p:sp>
-        <p:sp>
-          <p:nvSpPr>
-            <p:cNvPr id="32" name="Espace réservé du numéro de diapositive 3">
-              <a:extLst>
-                <a:ext uri="{FF2B5EF4-FFF2-40B4-BE49-F238E27FC236}">
-                  <a16:creationId xmlns:a16="http://schemas.microsoft.com/office/drawing/2014/main" id="{62A0FAC1-C455-41C2-9D82-004C66A15279}"/>
-                </a:ext>
-              </a:extLst>
-            </p:cNvPr>
-            <p:cNvSpPr txBox="1">
-              <a:spLocks/>
-            </p:cNvSpPr>
-            <p:nvPr/>
-          </p:nvSpPr>
-          <p:spPr>
-            <a:xfrm>
-              <a:off x="11341920" y="6642995"/>
-              <a:ext cx="778777" cy="179917"/>
-            </a:xfrm>
-            <a:prstGeom prst="rect">
-              <a:avLst/>
-            </a:prstGeom>
-          </p:spPr>
-          <p:txBody>
-            <a:bodyPr vert="horz" lIns="91440" tIns="45720" rIns="91440" bIns="45720" rtlCol="0" anchor="ctr"/>
-            <a:lstStyle>
-              <a:defPPr>
-                <a:defRPr lang="fr-FR"/>
-              </a:defPPr>
-              <a:lvl1pPr marL="0" algn="r" defTabSz="914400" rtl="0" eaLnBrk="1" latinLnBrk="0" hangingPunct="1">
-                <a:defRPr sz="1200" kern="1200">
-                  <a:solidFill>
-                    <a:schemeClr val="tx1">
-                      <a:tint val="75000"/>
-                    </a:schemeClr>
-                  </a:solidFill>
-                  <a:latin typeface="+mn-lt"/>
-                  <a:ea typeface="+mn-ea"/>
-                  <a:cs typeface="+mn-cs"/>
-                </a:defRPr>
-              </a:lvl1pPr>
-              <a:lvl2pPr marL="457200" algn="l" defTabSz="914400" rtl="0" eaLnBrk="1" latinLnBrk="0" hangingPunct="1">
-                <a:defRPr sz="1800" kern="1200">
-                  <a:solidFill>
-                    <a:schemeClr val="tx1"/>
-                  </a:solidFill>
-                  <a:latin typeface="+mn-lt"/>
-                  <a:ea typeface="+mn-ea"/>
-                  <a:cs typeface="+mn-cs"/>
-                </a:defRPr>
-              </a:lvl2pPr>
-              <a:lvl3pPr marL="914400" algn="l" defTabSz="914400" rtl="0" eaLnBrk="1" latinLnBrk="0" hangingPunct="1">
-                <a:defRPr sz="1800" kern="1200">
-                  <a:solidFill>
-                    <a:schemeClr val="tx1"/>
-                  </a:solidFill>
-                  <a:latin typeface="+mn-lt"/>
-                  <a:ea typeface="+mn-ea"/>
-                  <a:cs typeface="+mn-cs"/>
-                </a:defRPr>
-              </a:lvl3pPr>
-              <a:lvl4pPr marL="1371600" algn="l" defTabSz="914400" rtl="0" eaLnBrk="1" latinLnBrk="0" hangingPunct="1">
-                <a:defRPr sz="1800" kern="1200">
-                  <a:solidFill>
-                    <a:schemeClr val="tx1"/>
-                  </a:solidFill>
-                  <a:latin typeface="+mn-lt"/>
-                  <a:ea typeface="+mn-ea"/>
-                  <a:cs typeface="+mn-cs"/>
-                </a:defRPr>
-              </a:lvl4pPr>
-              <a:lvl5pPr marL="1828800" algn="l" defTabSz="914400" rtl="0" eaLnBrk="1" latinLnBrk="0" hangingPunct="1">
-                <a:defRPr sz="1800" kern="1200">
-                  <a:solidFill>
-                    <a:schemeClr val="tx1"/>
-                  </a:solidFill>
-                  <a:latin typeface="+mn-lt"/>
-                  <a:ea typeface="+mn-ea"/>
-                  <a:cs typeface="+mn-cs"/>
-                </a:defRPr>
-              </a:lvl5pPr>
-              <a:lvl6pPr marL="2286000" algn="l" defTabSz="914400" rtl="0" eaLnBrk="1" latinLnBrk="0" hangingPunct="1">
-                <a:defRPr sz="1800" kern="1200">
-                  <a:solidFill>
-                    <a:schemeClr val="tx1"/>
-                  </a:solidFill>
-                  <a:latin typeface="+mn-lt"/>
-                  <a:ea typeface="+mn-ea"/>
-                  <a:cs typeface="+mn-cs"/>
-                </a:defRPr>
-              </a:lvl6pPr>
-              <a:lvl7pPr marL="2743200" algn="l" defTabSz="914400" rtl="0" eaLnBrk="1" latinLnBrk="0" hangingPunct="1">
-                <a:defRPr sz="1800" kern="1200">
-                  <a:solidFill>
-                    <a:schemeClr val="tx1"/>
-                  </a:solidFill>
-                  <a:latin typeface="+mn-lt"/>
-                  <a:ea typeface="+mn-ea"/>
-                  <a:cs typeface="+mn-cs"/>
-                </a:defRPr>
-              </a:lvl7pPr>
-              <a:lvl8pPr marL="3200400" algn="l" defTabSz="914400" rtl="0" eaLnBrk="1" latinLnBrk="0" hangingPunct="1">
-                <a:defRPr sz="1800" kern="1200">
-                  <a:solidFill>
-                    <a:schemeClr val="tx1"/>
-                  </a:solidFill>
-                  <a:latin typeface="+mn-lt"/>
-                  <a:ea typeface="+mn-ea"/>
-                  <a:cs typeface="+mn-cs"/>
-                </a:defRPr>
-              </a:lvl8pPr>
-              <a:lvl9pPr marL="3657600" algn="l" defTabSz="914400" rtl="0" eaLnBrk="1" latinLnBrk="0" hangingPunct="1">
-                <a:defRPr sz="1800" kern="1200">
-                  <a:solidFill>
-                    <a:schemeClr val="tx1"/>
-                  </a:solidFill>
-                  <a:latin typeface="+mn-lt"/>
-                  <a:ea typeface="+mn-ea"/>
-                  <a:cs typeface="+mn-cs"/>
-                </a:defRPr>
-              </a:lvl9pPr>
-            </a:lstStyle>
-            <a:p>
-              <a:pPr>
-                <a:defRPr/>
-              </a:pPr>
-              <a:r>
-                <a:rPr lang="fr-FR" sz="800" dirty="0">
-                  <a:solidFill>
-                    <a:schemeClr val="bg1"/>
-                  </a:solidFill>
-                  <a:latin typeface="Baloo" panose="03080902040302020200" pitchFamily="66" charset="0"/>
-                  <a:cs typeface="Baloo" panose="03080902040302020200" pitchFamily="66" charset="0"/>
-                </a:rPr>
-                <a:t>PAGE </a:t>
-              </a:r>
-              <a:fld id="{111E0755-5AAA-45F3-A07E-A05D57A9C10E}" type="slidenum">
-                <a:rPr lang="fr-FR" sz="800" smtClean="0">
-                  <a:solidFill>
-                    <a:schemeClr val="bg1"/>
-                  </a:solidFill>
-                  <a:latin typeface="Baloo" panose="03080902040302020200" pitchFamily="66" charset="0"/>
-                  <a:cs typeface="Baloo" panose="03080902040302020200" pitchFamily="66" charset="0"/>
-                </a:rPr>
-                <a:pPr>
-                  <a:defRPr/>
-                </a:pPr>
-                <a:t>20</a:t>
-              </a:fld>
-              <a:endParaRPr lang="fr-FR" sz="800" dirty="0">
-                <a:solidFill>
-                  <a:schemeClr val="bg1"/>
-                </a:solidFill>
-                <a:latin typeface="Baloo" panose="03080902040302020200" pitchFamily="66" charset="0"/>
-                <a:cs typeface="Baloo" panose="03080902040302020200" pitchFamily="66" charset="0"/>
-              </a:endParaRPr>
-            </a:p>
-          </p:txBody>
-        </p:sp>
-        <p:sp>
-          <p:nvSpPr>
-            <p:cNvPr id="33" name="Triangle rectangle 32">
-              <a:extLst>
-                <a:ext uri="{FF2B5EF4-FFF2-40B4-BE49-F238E27FC236}">
-                  <a16:creationId xmlns:a16="http://schemas.microsoft.com/office/drawing/2014/main" id="{BB222F89-35F0-4463-B2DD-04BCACC05AF5}"/>
-                </a:ext>
-              </a:extLst>
-            </p:cNvPr>
-            <p:cNvSpPr/>
-            <p:nvPr/>
-          </p:nvSpPr>
-          <p:spPr>
-            <a:xfrm rot="5400000">
-              <a:off x="11254545" y="6568737"/>
-              <a:ext cx="299720" cy="259186"/>
-            </a:xfrm>
-            <a:prstGeom prst="rtTriangle">
-              <a:avLst/>
-            </a:prstGeom>
-            <a:solidFill>
-              <a:schemeClr val="bg1"/>
-            </a:solidFill>
-            <a:ln>
-              <a:solidFill>
-                <a:schemeClr val="bg1"/>
-              </a:solidFill>
-            </a:ln>
-          </p:spPr>
-          <p:style>
-            <a:lnRef idx="2">
-              <a:schemeClr val="accent1">
-                <a:shade val="50000"/>
-              </a:schemeClr>
-            </a:lnRef>
-            <a:fillRef idx="1">
-              <a:schemeClr val="accent1"/>
-            </a:fillRef>
-            <a:effectRef idx="0">
-              <a:schemeClr val="accent1"/>
-            </a:effectRef>
-            <a:fontRef idx="minor">
-              <a:schemeClr val="lt1"/>
-            </a:fontRef>
-          </p:style>
-          <p:txBody>
-            <a:bodyPr rtlCol="0" anchor="ctr"/>
-            <a:lstStyle/>
-            <a:p>
-              <a:pPr algn="ctr"/>
-              <a:endParaRPr lang="fr-FR" dirty="0"/>
-            </a:p>
-          </p:txBody>
-        </p:sp>
-      </p:grpSp>
-      <p:sp>
-        <p:nvSpPr>
-          <p:cNvPr id="2" name="Rectangle 1">
-            <a:extLst>
-              <a:ext uri="{FF2B5EF4-FFF2-40B4-BE49-F238E27FC236}">
-                <a16:creationId xmlns:a16="http://schemas.microsoft.com/office/drawing/2014/main" id="{2A64376D-B03F-430E-AB31-F93C3268EA01}"/>
-              </a:ext>
-            </a:extLst>
-          </p:cNvPr>
-          <p:cNvSpPr/>
-          <p:nvPr/>
-        </p:nvSpPr>
-        <p:spPr>
-          <a:xfrm>
-            <a:off x="-101600" y="-10160"/>
-            <a:ext cx="12293600" cy="6868160"/>
-          </a:xfrm>
-          <a:prstGeom prst="rect">
-            <a:avLst/>
-          </a:prstGeom>
-          <a:solidFill>
-            <a:srgbClr val="2A0068"/>
-          </a:solidFill>
-          <a:ln>
-            <a:solidFill>
-              <a:srgbClr val="2A0068"/>
-            </a:solidFill>
-          </a:ln>
-        </p:spPr>
-        <p:style>
-          <a:lnRef idx="2">
-            <a:schemeClr val="accent1">
-              <a:shade val="50000"/>
-            </a:schemeClr>
-          </a:lnRef>
-          <a:fillRef idx="1">
-            <a:schemeClr val="accent1"/>
-          </a:fillRef>
-          <a:effectRef idx="0">
-            <a:schemeClr val="accent1"/>
-          </a:effectRef>
-          <a:fontRef idx="minor">
-            <a:schemeClr val="lt1"/>
-          </a:fontRef>
-        </p:style>
-        <p:txBody>
-          <a:bodyPr rtlCol="0" anchor="ctr"/>
-          <a:lstStyle/>
-          <a:p>
-            <a:r>
-              <a:rPr lang="fr-FR" sz="8800" dirty="0"/>
-              <a:t>	4. Conclusion</a:t>
-            </a:r>
-          </a:p>
-          <a:p>
-            <a:r>
-              <a:rPr lang="fr-FR" sz="4000" dirty="0"/>
-              <a:t>	Points d’amélioration possibles</a:t>
-            </a:r>
-          </a:p>
-          <a:p>
-            <a:r>
-              <a:rPr lang="fr-FR" sz="4000" dirty="0"/>
-              <a:t>	Q&amp;A</a:t>
-            </a:r>
-          </a:p>
-          <a:p>
-            <a:r>
-              <a:rPr lang="fr-FR" sz="4000" dirty="0"/>
-              <a:t>	</a:t>
-            </a:r>
-          </a:p>
-        </p:txBody>
-      </p:sp>
-      <p:cxnSp>
-        <p:nvCxnSpPr>
-          <p:cNvPr id="4" name="Connecteur droit 3">
-            <a:extLst>
-              <a:ext uri="{FF2B5EF4-FFF2-40B4-BE49-F238E27FC236}">
-                <a16:creationId xmlns:a16="http://schemas.microsoft.com/office/drawing/2014/main" id="{6628E5E9-8C81-4D31-A167-A0BD9A996233}"/>
-              </a:ext>
-            </a:extLst>
-          </p:cNvPr>
-          <p:cNvCxnSpPr/>
-          <p:nvPr/>
-        </p:nvCxnSpPr>
-        <p:spPr>
-          <a:xfrm>
-            <a:off x="284480" y="3098800"/>
-            <a:ext cx="11446828" cy="0"/>
-          </a:xfrm>
-          <a:prstGeom prst="line">
-            <a:avLst/>
-          </a:prstGeom>
-          <a:ln>
-            <a:solidFill>
-              <a:schemeClr val="bg1"/>
-            </a:solidFill>
-          </a:ln>
-        </p:spPr>
-        <p:style>
-          <a:lnRef idx="1">
-            <a:schemeClr val="accent1"/>
-          </a:lnRef>
-          <a:fillRef idx="0">
-            <a:schemeClr val="accent1"/>
-          </a:fillRef>
-          <a:effectRef idx="0">
-            <a:schemeClr val="accent1"/>
-          </a:effectRef>
-          <a:fontRef idx="minor">
-            <a:schemeClr val="tx1"/>
-          </a:fontRef>
-        </p:style>
-      </p:cxnSp>
-    </p:spTree>
-    <p:extLst>
-      <p:ext uri="{BB962C8B-B14F-4D97-AF65-F5344CB8AC3E}">
-        <p14:creationId xmlns:p14="http://schemas.microsoft.com/office/powerpoint/2010/main" val="2511860389"/>
-      </p:ext>
-    </p:extLst>
-  </p:cSld>
-  <p:clrMapOvr>
-    <a:masterClrMapping/>
-  </p:clrMapOvr>
-</p:sld>
-</file>
-
-<file path=ppt/slides/slide21.xml><?xml version="1.0" encoding="utf-8"?>
-<p:sld xmlns:a="http://schemas.openxmlformats.org/drawingml/2006/main" xmlns:r="http://schemas.openxmlformats.org/officeDocument/2006/relationships" xmlns:p="http://schemas.openxmlformats.org/presentationml/2006/main">
-  <p:cSld>
-    <p:spTree>
-      <p:nvGrpSpPr>
-        <p:cNvPr id="1" name=""/>
-        <p:cNvGrpSpPr/>
-        <p:nvPr/>
-      </p:nvGrpSpPr>
-      <p:grpSpPr>
-        <a:xfrm>
-          <a:off x="0" y="0"/>
-          <a:ext cx="0" cy="0"/>
-          <a:chOff x="0" y="0"/>
-          <a:chExt cx="0" cy="0"/>
-        </a:xfrm>
-      </p:grpSpPr>
       <p:graphicFrame>
         <p:nvGraphicFramePr>
           <p:cNvPr id="5" name="Objet 4" hidden="1">
@@ -23265,7 +22826,7 @@
           <a:graphicData uri="http://schemas.openxmlformats.org/presentationml/2006/ole">
             <mc:AlternateContent xmlns:mc="http://schemas.openxmlformats.org/markup-compatibility/2006">
               <mc:Choice xmlns:v="urn:schemas-microsoft-com:vml" Requires="v">
-                <p:oleObj spid="_x0000_s41989" name="Diapositive think-cell" r:id="rId4" imgW="415" imgH="416" progId="TCLayout.ActiveDocument.1">
+                <p:oleObj spid="_x0000_s49157" name="Diapositive think-cell" r:id="rId4" imgW="415" imgH="416" progId="TCLayout.ActiveDocument.1">
                   <p:embed/>
                 </p:oleObj>
               </mc:Choice>
@@ -23308,32 +22869,30 @@
       </p:graphicFrame>
       <p:sp>
         <p:nvSpPr>
-          <p:cNvPr id="34" name="Rectangle 33">
-            <a:extLst>
-              <a:ext uri="{FF2B5EF4-FFF2-40B4-BE49-F238E27FC236}">
-                <a16:creationId xmlns:a16="http://schemas.microsoft.com/office/drawing/2014/main" id="{86A52CCD-9959-43E4-90E1-14C68071D2EF}"/>
-              </a:ext>
-            </a:extLst>
-          </p:cNvPr>
-          <p:cNvSpPr>
-            <a:spLocks/>
-          </p:cNvSpPr>
+          <p:cNvPr id="4" name="Rectangle 3">
+            <a:extLst>
+              <a:ext uri="{FF2B5EF4-FFF2-40B4-BE49-F238E27FC236}">
+                <a16:creationId xmlns:a16="http://schemas.microsoft.com/office/drawing/2014/main" id="{5FB2769F-594F-433F-A363-4009F6BE7A21}"/>
+              </a:ext>
+            </a:extLst>
+          </p:cNvPr>
+          <p:cNvSpPr/>
           <p:nvPr/>
         </p:nvSpPr>
         <p:spPr>
           <a:xfrm>
-            <a:off x="-1546" y="0"/>
-            <a:ext cx="12193545" cy="544108"/>
+            <a:off x="0" y="0"/>
+            <a:ext cx="12192000" cy="6858000"/>
           </a:xfrm>
           <a:prstGeom prst="rect">
             <a:avLst/>
           </a:prstGeom>
           <a:solidFill>
-            <a:srgbClr val="D7D8D7"/>
+            <a:srgbClr val="0D1117"/>
           </a:solidFill>
           <a:ln>
             <a:solidFill>
-              <a:srgbClr val="D7D8D7"/>
+              <a:schemeClr val="tx1"/>
             </a:solidFill>
           </a:ln>
         </p:spPr>
@@ -23358,49 +22917,36 @@
           <a:lstStyle/>
           <a:p>
             <a:pPr algn="ctr"/>
-            <a:endParaRPr lang="LID4096">
-              <a:uFillTx/>
-            </a:endParaRPr>
+            <a:endParaRPr lang="fr-FR"/>
           </a:p>
         </p:txBody>
       </p:sp>
       <p:sp>
         <p:nvSpPr>
-          <p:cNvPr id="70" name="Oval 21">
-            <a:extLst>
-              <a:ext uri="{FF2B5EF4-FFF2-40B4-BE49-F238E27FC236}">
-                <a16:creationId xmlns:a16="http://schemas.microsoft.com/office/drawing/2014/main" id="{21E00B41-C90D-4BDF-A077-C8F7B556C7BC}"/>
-              </a:ext>
-            </a:extLst>
-          </p:cNvPr>
-          <p:cNvSpPr>
-            <a:spLocks/>
-          </p:cNvSpPr>
+          <p:cNvPr id="9" name="Rectangle 8">
+            <a:extLst>
+              <a:ext uri="{FF2B5EF4-FFF2-40B4-BE49-F238E27FC236}">
+                <a16:creationId xmlns:a16="http://schemas.microsoft.com/office/drawing/2014/main" id="{EEE8DC0B-F961-4AF2-B6F3-95AF3811AC7C}"/>
+              </a:ext>
+            </a:extLst>
+          </p:cNvPr>
+          <p:cNvSpPr/>
           <p:nvPr/>
         </p:nvSpPr>
         <p:spPr>
           <a:xfrm>
-            <a:off x="4891314" y="-223688"/>
-            <a:ext cx="2409372" cy="1008000"/>
-          </a:xfrm>
-          <a:prstGeom prst="ellipse">
+            <a:off x="12700" y="26634"/>
+            <a:ext cx="2376000" cy="6858000"/>
+          </a:xfrm>
+          <a:prstGeom prst="rect">
             <a:avLst/>
           </a:prstGeom>
           <a:solidFill>
-            <a:srgbClr val="D7D8D7"/>
+            <a:srgbClr val="262730"/>
           </a:solidFill>
-          <a:ln w="12700">
-            <a:solidFill>
-              <a:schemeClr val="bg1"/>
-            </a:solidFill>
+          <a:ln>
+            <a:noFill/>
           </a:ln>
-          <a:effectLst>
-            <a:outerShdw blurRad="50800" dist="38100" dir="2700000" algn="tl" rotWithShape="0">
-              <a:srgbClr val="000000">
-                <a:alpha val="40000"/>
-              </a:srgbClr>
-            </a:outerShdw>
-          </a:effectLst>
         </p:spPr>
         <p:style>
           <a:lnRef idx="2">
@@ -23423,253 +22969,70 @@
           <a:lstStyle/>
           <a:p>
             <a:pPr algn="ctr"/>
-            <a:endParaRPr lang="LID4096" dirty="0">
-              <a:solidFill>
-                <a:srgbClr val="2A0068"/>
-              </a:solidFill>
-              <a:uFillTx/>
-              <a:latin typeface="Baloo" panose="03080902040302020200" pitchFamily="66" charset="0"/>
-              <a:cs typeface="Baloo" panose="03080902040302020200" pitchFamily="66" charset="0"/>
-            </a:endParaRPr>
+            <a:endParaRPr lang="fr-FR"/>
           </a:p>
         </p:txBody>
       </p:sp>
-      <p:sp>
-        <p:nvSpPr>
-          <p:cNvPr id="73" name="Rectangle 72">
-            <a:extLst>
-              <a:ext uri="{FF2B5EF4-FFF2-40B4-BE49-F238E27FC236}">
-                <a16:creationId xmlns:a16="http://schemas.microsoft.com/office/drawing/2014/main" id="{9F990D0F-3A28-4858-B939-D0DB6600268A}"/>
-              </a:ext>
-            </a:extLst>
-          </p:cNvPr>
-          <p:cNvSpPr>
-            <a:spLocks/>
-          </p:cNvSpPr>
-          <p:nvPr/>
-        </p:nvSpPr>
-        <p:spPr>
-          <a:xfrm>
-            <a:off x="4530058" y="-249582"/>
-            <a:ext cx="3131884" cy="783727"/>
+      <p:pic>
+        <p:nvPicPr>
+          <p:cNvPr id="6" name="Image 5">
+            <a:extLst>
+              <a:ext uri="{FF2B5EF4-FFF2-40B4-BE49-F238E27FC236}">
+                <a16:creationId xmlns:a16="http://schemas.microsoft.com/office/drawing/2014/main" id="{D6212916-655F-49E5-B949-90ED3FC9F88B}"/>
+              </a:ext>
+            </a:extLst>
+          </p:cNvPr>
+          <p:cNvPicPr>
+            <a:picLocks noChangeAspect="1"/>
+          </p:cNvPicPr>
+          <p:nvPr/>
+        </p:nvPicPr>
+        <p:blipFill>
+          <a:blip r:embed="rId6"/>
+          <a:stretch>
+            <a:fillRect/>
+          </a:stretch>
+        </p:blipFill>
+        <p:spPr>
+          <a:xfrm>
+            <a:off x="25725" y="507851"/>
+            <a:ext cx="12175447" cy="5796000"/>
           </a:xfrm>
           <a:prstGeom prst="rect">
             <a:avLst/>
           </a:prstGeom>
-          <a:solidFill>
-            <a:srgbClr val="D7D8D7"/>
-          </a:solidFill>
-          <a:ln>
-            <a:solidFill>
-              <a:srgbClr val="D7D8D7"/>
-            </a:solidFill>
-          </a:ln>
-        </p:spPr>
-        <p:style>
-          <a:lnRef idx="2">
-            <a:schemeClr val="accent1">
-              <a:shade val="50000"/>
-            </a:schemeClr>
-          </a:lnRef>
-          <a:fillRef idx="1">
-            <a:schemeClr val="accent1"/>
-          </a:fillRef>
-          <a:effectRef idx="0">
-            <a:schemeClr val="accent1"/>
-          </a:effectRef>
-          <a:fontRef idx="minor">
-            <a:schemeClr val="lt1"/>
-          </a:fontRef>
-        </p:style>
-        <p:txBody>
-          <a:bodyPr rtlCol="0" anchor="ctr"/>
-          <a:lstStyle/>
-          <a:p>
-            <a:pPr algn="ctr"/>
-            <a:endParaRPr lang="LID4096">
-              <a:uFillTx/>
-            </a:endParaRPr>
-          </a:p>
-        </p:txBody>
-      </p:sp>
-      <p:cxnSp>
-        <p:nvCxnSpPr>
-          <p:cNvPr id="74" name="Straight Connector 36">
-            <a:extLst>
-              <a:ext uri="{FF2B5EF4-FFF2-40B4-BE49-F238E27FC236}">
-                <a16:creationId xmlns:a16="http://schemas.microsoft.com/office/drawing/2014/main" id="{6AC8BA9A-5A95-442A-86B2-D6471C273567}"/>
-              </a:ext>
-            </a:extLst>
-          </p:cNvPr>
-          <p:cNvCxnSpPr/>
-          <p:nvPr/>
-        </p:nvCxnSpPr>
-        <p:spPr>
-          <a:xfrm>
-            <a:off x="4696733" y="190333"/>
-            <a:ext cx="0" cy="216000"/>
-          </a:xfrm>
-          <a:prstGeom prst="line">
-            <a:avLst/>
-          </a:prstGeom>
-          <a:ln>
-            <a:solidFill>
-              <a:schemeClr val="bg1">
-                <a:lumMod val="75000"/>
-              </a:schemeClr>
-            </a:solidFill>
-          </a:ln>
-        </p:spPr>
-        <p:style>
-          <a:lnRef idx="1">
-            <a:schemeClr val="accent1"/>
-          </a:lnRef>
-          <a:fillRef idx="0">
-            <a:schemeClr val="accent1"/>
-          </a:fillRef>
-          <a:effectRef idx="0">
-            <a:schemeClr val="accent1"/>
-          </a:effectRef>
-          <a:fontRef idx="minor">
-            <a:schemeClr val="tx1"/>
-          </a:fontRef>
-        </p:style>
-      </p:cxnSp>
-      <p:cxnSp>
-        <p:nvCxnSpPr>
-          <p:cNvPr id="75" name="Straight Connector 36">
-            <a:extLst>
-              <a:ext uri="{FF2B5EF4-FFF2-40B4-BE49-F238E27FC236}">
-                <a16:creationId xmlns:a16="http://schemas.microsoft.com/office/drawing/2014/main" id="{3F5750F7-3C85-48DA-BD57-0EB1C694D16F}"/>
-              </a:ext>
-            </a:extLst>
-          </p:cNvPr>
-          <p:cNvCxnSpPr/>
-          <p:nvPr/>
-        </p:nvCxnSpPr>
-        <p:spPr>
-          <a:xfrm>
-            <a:off x="2028856" y="197590"/>
-            <a:ext cx="0" cy="216000"/>
-          </a:xfrm>
-          <a:prstGeom prst="line">
-            <a:avLst/>
-          </a:prstGeom>
-          <a:ln>
-            <a:solidFill>
-              <a:schemeClr val="bg1">
-                <a:lumMod val="75000"/>
-              </a:schemeClr>
-            </a:solidFill>
-          </a:ln>
-        </p:spPr>
-        <p:style>
-          <a:lnRef idx="1">
-            <a:schemeClr val="accent1"/>
-          </a:lnRef>
-          <a:fillRef idx="0">
-            <a:schemeClr val="accent1"/>
-          </a:fillRef>
-          <a:effectRef idx="0">
-            <a:schemeClr val="accent1"/>
-          </a:effectRef>
-          <a:fontRef idx="minor">
-            <a:schemeClr val="tx1"/>
-          </a:fontRef>
-        </p:style>
-      </p:cxnSp>
-      <p:sp>
-        <p:nvSpPr>
-          <p:cNvPr id="79" name="TextBox 26">
-            <a:extLst>
-              <a:ext uri="{FF2B5EF4-FFF2-40B4-BE49-F238E27FC236}">
-                <a16:creationId xmlns:a16="http://schemas.microsoft.com/office/drawing/2014/main" id="{39F69F4E-3B4A-41B5-8C1D-64E9A4BC90EE}"/>
-              </a:ext>
-            </a:extLst>
-          </p:cNvPr>
-          <p:cNvSpPr txBox="1">
-            <a:spLocks/>
-          </p:cNvSpPr>
-          <p:nvPr/>
-        </p:nvSpPr>
-        <p:spPr>
-          <a:xfrm>
-            <a:off x="7287" y="142281"/>
-            <a:ext cx="2052000" cy="307777"/>
-          </a:xfrm>
-          <a:prstGeom prst="rect">
-            <a:avLst/>
-          </a:prstGeom>
-          <a:noFill/>
-          <a:ln>
-            <a:noFill/>
-          </a:ln>
-        </p:spPr>
-        <p:txBody>
-          <a:bodyPr wrap="square" rtlCol="0">
-            <a:spAutoFit/>
-          </a:bodyPr>
-          <a:lstStyle/>
-          <a:p>
-            <a:pPr algn="ctr"/>
-            <a:r>
-              <a:rPr lang="fr-FR" sz="1400" b="1" dirty="0">
-                <a:solidFill>
-                  <a:schemeClr val="accent3"/>
-                </a:solidFill>
-                <a:latin typeface="Trebuchet MS" panose="020B0603020202020204" pitchFamily="34" charset="0"/>
-              </a:rPr>
-              <a:t>CONTEXTE</a:t>
-            </a:r>
-          </a:p>
-        </p:txBody>
-      </p:sp>
-      <p:sp>
-        <p:nvSpPr>
-          <p:cNvPr id="81" name="TextBox 26">
-            <a:extLst>
-              <a:ext uri="{FF2B5EF4-FFF2-40B4-BE49-F238E27FC236}">
-                <a16:creationId xmlns:a16="http://schemas.microsoft.com/office/drawing/2014/main" id="{57D0B7C0-DC57-431F-8DD5-2F8B24747D09}"/>
-              </a:ext>
-            </a:extLst>
-          </p:cNvPr>
-          <p:cNvSpPr txBox="1">
-            <a:spLocks/>
-          </p:cNvSpPr>
-          <p:nvPr/>
-        </p:nvSpPr>
-        <p:spPr>
-          <a:xfrm>
-            <a:off x="2059287" y="146805"/>
-            <a:ext cx="2891751" cy="305940"/>
-          </a:xfrm>
-          <a:prstGeom prst="rect">
-            <a:avLst/>
-          </a:prstGeom>
-          <a:noFill/>
-          <a:ln>
-            <a:noFill/>
-          </a:ln>
-        </p:spPr>
-        <p:txBody>
-          <a:bodyPr wrap="square" rtlCol="0">
-            <a:spAutoFit/>
-          </a:bodyPr>
-          <a:lstStyle/>
-          <a:p>
-            <a:pPr algn="ctr"/>
-            <a:r>
-              <a:rPr lang="fr-FR" sz="1400" b="1" dirty="0">
-                <a:solidFill>
-                  <a:schemeClr val="accent3"/>
-                </a:solidFill>
-                <a:latin typeface="Trebuchet MS" panose="020B0603020202020204" pitchFamily="34" charset="0"/>
-              </a:rPr>
-              <a:t>MODÉLISATION</a:t>
-            </a:r>
-          </a:p>
-        </p:txBody>
-      </p:sp>
+        </p:spPr>
+      </p:pic>
+    </p:spTree>
+    <p:extLst>
+      <p:ext uri="{BB962C8B-B14F-4D97-AF65-F5344CB8AC3E}">
+        <p14:creationId xmlns:p14="http://schemas.microsoft.com/office/powerpoint/2010/main" val="3291461028"/>
+      </p:ext>
+    </p:extLst>
+  </p:cSld>
+  <p:clrMapOvr>
+    <a:masterClrMapping/>
+  </p:clrMapOvr>
+</p:sld>
+</file>
+
+<file path=ppt/slides/slide21.xml><?xml version="1.0" encoding="utf-8"?>
+<p:sld xmlns:a="http://schemas.openxmlformats.org/drawingml/2006/main" xmlns:r="http://schemas.openxmlformats.org/officeDocument/2006/relationships" xmlns:p="http://schemas.openxmlformats.org/presentationml/2006/main">
+  <p:cSld>
+    <p:spTree>
+      <p:nvGrpSpPr>
+        <p:cNvPr id="1" name=""/>
+        <p:cNvGrpSpPr/>
+        <p:nvPr/>
+      </p:nvGrpSpPr>
+      <p:grpSpPr>
+        <a:xfrm>
+          <a:off x="0" y="0"/>
+          <a:ext cx="0" cy="0"/>
+          <a:chOff x="0" y="0"/>
+          <a:chExt cx="0" cy="0"/>
+        </a:xfrm>
+      </p:grpSpPr>
       <p:grpSp>
         <p:nvGrpSpPr>
           <p:cNvPr id="30" name="Groupe 29">
@@ -23958,375 +23321,34 @@
           </p:txBody>
         </p:sp>
       </p:grpSp>
-      <p:pic>
-        <p:nvPicPr>
-          <p:cNvPr id="3" name="Image 2">
-            <a:extLst>
-              <a:ext uri="{FF2B5EF4-FFF2-40B4-BE49-F238E27FC236}">
-                <a16:creationId xmlns:a16="http://schemas.microsoft.com/office/drawing/2014/main" id="{7A389926-05FB-4C34-A31D-E1334EF99F46}"/>
-              </a:ext>
-            </a:extLst>
-          </p:cNvPr>
-          <p:cNvPicPr>
-            <a:picLocks noChangeAspect="1"/>
-          </p:cNvPicPr>
-          <p:nvPr/>
-        </p:nvPicPr>
-        <p:blipFill>
-          <a:blip r:embed="rId6"/>
-          <a:stretch>
-            <a:fillRect/>
-          </a:stretch>
-        </p:blipFill>
-        <p:spPr>
-          <a:xfrm>
-            <a:off x="4848447" y="0"/>
-            <a:ext cx="2524125" cy="495300"/>
+      <p:sp>
+        <p:nvSpPr>
+          <p:cNvPr id="2" name="Rectangle 1">
+            <a:extLst>
+              <a:ext uri="{FF2B5EF4-FFF2-40B4-BE49-F238E27FC236}">
+                <a16:creationId xmlns:a16="http://schemas.microsoft.com/office/drawing/2014/main" id="{2A64376D-B03F-430E-AB31-F93C3268EA01}"/>
+              </a:ext>
+            </a:extLst>
+          </p:cNvPr>
+          <p:cNvSpPr/>
+          <p:nvPr/>
+        </p:nvSpPr>
+        <p:spPr>
+          <a:xfrm>
+            <a:off x="-101600" y="-10160"/>
+            <a:ext cx="12293600" cy="6868160"/>
           </a:xfrm>
           <a:prstGeom prst="rect">
             <a:avLst/>
           </a:prstGeom>
-        </p:spPr>
-      </p:pic>
-      <p:cxnSp>
-        <p:nvCxnSpPr>
-          <p:cNvPr id="71" name="Straight Connector 22">
-            <a:extLst>
-              <a:ext uri="{FF2B5EF4-FFF2-40B4-BE49-F238E27FC236}">
-                <a16:creationId xmlns:a16="http://schemas.microsoft.com/office/drawing/2014/main" id="{3E677F3D-C08E-49B3-BFF4-7E1553EE5144}"/>
-              </a:ext>
-            </a:extLst>
-          </p:cNvPr>
-          <p:cNvCxnSpPr>
-            <a:cxnSpLocks/>
-          </p:cNvCxnSpPr>
-          <p:nvPr/>
-        </p:nvCxnSpPr>
-        <p:spPr>
-          <a:xfrm>
-            <a:off x="-21590" y="548496"/>
-            <a:ext cx="5117779" cy="14365"/>
-          </a:xfrm>
-          <a:prstGeom prst="line">
-            <a:avLst/>
-          </a:prstGeom>
-          <a:ln w="12700">
+          <a:solidFill>
+            <a:srgbClr val="2A0068"/>
+          </a:solidFill>
+          <a:ln>
             <a:solidFill>
-              <a:schemeClr val="bg1"/>
+              <a:srgbClr val="2A0068"/>
             </a:solidFill>
           </a:ln>
-          <a:effectLst>
-            <a:outerShdw blurRad="50800" dist="38100" dir="2700000" algn="tl" rotWithShape="0">
-              <a:srgbClr val="000000">
-                <a:alpha val="40000"/>
-              </a:srgbClr>
-            </a:outerShdw>
-          </a:effectLst>
-        </p:spPr>
-        <p:style>
-          <a:lnRef idx="1">
-            <a:schemeClr val="accent1"/>
-          </a:lnRef>
-          <a:fillRef idx="0">
-            <a:schemeClr val="accent1"/>
-          </a:fillRef>
-          <a:effectRef idx="0">
-            <a:schemeClr val="accent1"/>
-          </a:effectRef>
-          <a:fontRef idx="minor">
-            <a:schemeClr val="tx1"/>
-          </a:fontRef>
-        </p:style>
-      </p:cxnSp>
-      <p:sp>
-        <p:nvSpPr>
-          <p:cNvPr id="22" name="Rectangle 21">
-            <a:extLst>
-              <a:ext uri="{FF2B5EF4-FFF2-40B4-BE49-F238E27FC236}">
-                <a16:creationId xmlns:a16="http://schemas.microsoft.com/office/drawing/2014/main" id="{B3E40F35-6F18-4795-94D0-0D751C6B0722}"/>
-              </a:ext>
-            </a:extLst>
-          </p:cNvPr>
-          <p:cNvSpPr/>
-          <p:nvPr/>
-        </p:nvSpPr>
-        <p:spPr>
-          <a:xfrm>
-            <a:off x="353226" y="892388"/>
-            <a:ext cx="11484000" cy="523220"/>
-          </a:xfrm>
-          <a:prstGeom prst="rect">
-            <a:avLst/>
-          </a:prstGeom>
-          <a:ln>
-            <a:noFill/>
-          </a:ln>
-        </p:spPr>
-        <p:txBody>
-          <a:bodyPr wrap="square">
-            <a:spAutoFit/>
-          </a:bodyPr>
-          <a:lstStyle/>
-          <a:p>
-            <a:r>
-              <a:rPr lang="fr-FR" sz="2800" b="1" dirty="0">
-                <a:solidFill>
-                  <a:srgbClr val="2A0068"/>
-                </a:solidFill>
-              </a:rPr>
-              <a:t>Points d’améliorations</a:t>
-            </a:r>
-          </a:p>
-        </p:txBody>
-      </p:sp>
-      <p:sp>
-        <p:nvSpPr>
-          <p:cNvPr id="40" name="TextBox 26">
-            <a:extLst>
-              <a:ext uri="{FF2B5EF4-FFF2-40B4-BE49-F238E27FC236}">
-                <a16:creationId xmlns:a16="http://schemas.microsoft.com/office/drawing/2014/main" id="{7F06B964-FE45-44D1-A532-BC3FA2FDC537}"/>
-              </a:ext>
-            </a:extLst>
-          </p:cNvPr>
-          <p:cNvSpPr txBox="1">
-            <a:spLocks/>
-          </p:cNvSpPr>
-          <p:nvPr/>
-        </p:nvSpPr>
-        <p:spPr>
-          <a:xfrm>
-            <a:off x="7424298" y="146062"/>
-            <a:ext cx="2664000" cy="307777"/>
-          </a:xfrm>
-          <a:prstGeom prst="rect">
-            <a:avLst/>
-          </a:prstGeom>
-          <a:noFill/>
-          <a:ln>
-            <a:noFill/>
-          </a:ln>
-        </p:spPr>
-        <p:txBody>
-          <a:bodyPr wrap="square" rtlCol="0">
-            <a:spAutoFit/>
-          </a:bodyPr>
-          <a:lstStyle/>
-          <a:p>
-            <a:pPr algn="ctr"/>
-            <a:r>
-              <a:rPr lang="fr-FR" sz="1400" b="1" dirty="0">
-                <a:solidFill>
-                  <a:srgbClr val="2A0068"/>
-                </a:solidFill>
-                <a:latin typeface="Trebuchet MS" panose="020B0603020202020204" pitchFamily="34" charset="0"/>
-              </a:rPr>
-              <a:t>DASHBOARD</a:t>
-            </a:r>
-          </a:p>
-        </p:txBody>
-      </p:sp>
-      <p:cxnSp>
-        <p:nvCxnSpPr>
-          <p:cNvPr id="41" name="Straight Connector 36">
-            <a:extLst>
-              <a:ext uri="{FF2B5EF4-FFF2-40B4-BE49-F238E27FC236}">
-                <a16:creationId xmlns:a16="http://schemas.microsoft.com/office/drawing/2014/main" id="{00C750FE-B05E-4CEA-853A-6B0B947ECC04}"/>
-              </a:ext>
-            </a:extLst>
-          </p:cNvPr>
-          <p:cNvCxnSpPr/>
-          <p:nvPr/>
-        </p:nvCxnSpPr>
-        <p:spPr>
-          <a:xfrm>
-            <a:off x="7536962" y="199069"/>
-            <a:ext cx="0" cy="216000"/>
-          </a:xfrm>
-          <a:prstGeom prst="line">
-            <a:avLst/>
-          </a:prstGeom>
-          <a:ln>
-            <a:solidFill>
-              <a:schemeClr val="bg1">
-                <a:lumMod val="75000"/>
-              </a:schemeClr>
-            </a:solidFill>
-          </a:ln>
-        </p:spPr>
-        <p:style>
-          <a:lnRef idx="1">
-            <a:schemeClr val="accent1"/>
-          </a:lnRef>
-          <a:fillRef idx="0">
-            <a:schemeClr val="accent1"/>
-          </a:fillRef>
-          <a:effectRef idx="0">
-            <a:schemeClr val="accent1"/>
-          </a:effectRef>
-          <a:fontRef idx="minor">
-            <a:schemeClr val="tx1"/>
-          </a:fontRef>
-        </p:style>
-      </p:cxnSp>
-      <p:sp>
-        <p:nvSpPr>
-          <p:cNvPr id="42" name="TextBox 26">
-            <a:extLst>
-              <a:ext uri="{FF2B5EF4-FFF2-40B4-BE49-F238E27FC236}">
-                <a16:creationId xmlns:a16="http://schemas.microsoft.com/office/drawing/2014/main" id="{FE588524-D155-4A00-A514-94869C5E5025}"/>
-              </a:ext>
-            </a:extLst>
-          </p:cNvPr>
-          <p:cNvSpPr txBox="1">
-            <a:spLocks/>
-          </p:cNvSpPr>
-          <p:nvPr/>
-        </p:nvSpPr>
-        <p:spPr>
-          <a:xfrm>
-            <a:off x="10103603" y="144968"/>
-            <a:ext cx="2052000" cy="307777"/>
-          </a:xfrm>
-          <a:prstGeom prst="rect">
-            <a:avLst/>
-          </a:prstGeom>
-          <a:noFill/>
-          <a:ln>
-            <a:noFill/>
-          </a:ln>
-        </p:spPr>
-        <p:txBody>
-          <a:bodyPr wrap="square" rtlCol="0">
-            <a:spAutoFit/>
-          </a:bodyPr>
-          <a:lstStyle/>
-          <a:p>
-            <a:pPr algn="ctr"/>
-            <a:r>
-              <a:rPr lang="fr-FR" sz="1400" b="1" dirty="0">
-                <a:solidFill>
-                  <a:schemeClr val="accent3"/>
-                </a:solidFill>
-                <a:latin typeface="Trebuchet MS" panose="020B0603020202020204" pitchFamily="34" charset="0"/>
-              </a:rPr>
-              <a:t>CONCLUSION / Q&amp;A</a:t>
-            </a:r>
-          </a:p>
-        </p:txBody>
-      </p:sp>
-      <p:cxnSp>
-        <p:nvCxnSpPr>
-          <p:cNvPr id="43" name="Straight Connector 36">
-            <a:extLst>
-              <a:ext uri="{FF2B5EF4-FFF2-40B4-BE49-F238E27FC236}">
-                <a16:creationId xmlns:a16="http://schemas.microsoft.com/office/drawing/2014/main" id="{7718A675-293C-49B9-8796-EB7B4B00B458}"/>
-              </a:ext>
-            </a:extLst>
-          </p:cNvPr>
-          <p:cNvCxnSpPr/>
-          <p:nvPr/>
-        </p:nvCxnSpPr>
-        <p:spPr>
-          <a:xfrm>
-            <a:off x="10081246" y="197450"/>
-            <a:ext cx="0" cy="216000"/>
-          </a:xfrm>
-          <a:prstGeom prst="line">
-            <a:avLst/>
-          </a:prstGeom>
-          <a:ln>
-            <a:solidFill>
-              <a:schemeClr val="bg1">
-                <a:lumMod val="75000"/>
-              </a:schemeClr>
-            </a:solidFill>
-          </a:ln>
-        </p:spPr>
-        <p:style>
-          <a:lnRef idx="1">
-            <a:schemeClr val="accent1"/>
-          </a:lnRef>
-          <a:fillRef idx="0">
-            <a:schemeClr val="accent1"/>
-          </a:fillRef>
-          <a:effectRef idx="0">
-            <a:schemeClr val="accent1"/>
-          </a:effectRef>
-          <a:fontRef idx="minor">
-            <a:schemeClr val="tx1"/>
-          </a:fontRef>
-        </p:style>
-      </p:cxnSp>
-      <p:cxnSp>
-        <p:nvCxnSpPr>
-          <p:cNvPr id="44" name="Straight Connector 23">
-            <a:extLst>
-              <a:ext uri="{FF2B5EF4-FFF2-40B4-BE49-F238E27FC236}">
-                <a16:creationId xmlns:a16="http://schemas.microsoft.com/office/drawing/2014/main" id="{BF677A9E-33AD-4749-AA81-4DFE76D51288}"/>
-              </a:ext>
-            </a:extLst>
-          </p:cNvPr>
-          <p:cNvCxnSpPr>
-            <a:cxnSpLocks/>
-          </p:cNvCxnSpPr>
-          <p:nvPr/>
-        </p:nvCxnSpPr>
-        <p:spPr>
-          <a:xfrm flipV="1">
-            <a:off x="7103948" y="540993"/>
-            <a:ext cx="5118532" cy="11708"/>
-          </a:xfrm>
-          <a:prstGeom prst="line">
-            <a:avLst/>
-          </a:prstGeom>
-          <a:ln w="12700">
-            <a:solidFill>
-              <a:schemeClr val="bg1"/>
-            </a:solidFill>
-          </a:ln>
-          <a:effectLst>
-            <a:outerShdw blurRad="50800" dist="38100" dir="2700000" algn="tl" rotWithShape="0">
-              <a:srgbClr val="000000">
-                <a:alpha val="40000"/>
-              </a:srgbClr>
-            </a:outerShdw>
-          </a:effectLst>
-        </p:spPr>
-        <p:style>
-          <a:lnRef idx="1">
-            <a:schemeClr val="accent1"/>
-          </a:lnRef>
-          <a:fillRef idx="0">
-            <a:schemeClr val="accent1"/>
-          </a:fillRef>
-          <a:effectRef idx="0">
-            <a:schemeClr val="accent1"/>
-          </a:effectRef>
-          <a:fontRef idx="minor">
-            <a:schemeClr val="tx1"/>
-          </a:fontRef>
-        </p:style>
-      </p:cxnSp>
-      <p:sp>
-        <p:nvSpPr>
-          <p:cNvPr id="26" name="Rectangle 25">
-            <a:extLst>
-              <a:ext uri="{FF2B5EF4-FFF2-40B4-BE49-F238E27FC236}">
-                <a16:creationId xmlns:a16="http://schemas.microsoft.com/office/drawing/2014/main" id="{7AB40AB7-2145-4A11-94BC-E88DBECBC45B}"/>
-              </a:ext>
-            </a:extLst>
-          </p:cNvPr>
-          <p:cNvSpPr/>
-          <p:nvPr/>
-        </p:nvSpPr>
-        <p:spPr>
-          <a:xfrm>
-            <a:off x="623352" y="1415608"/>
-            <a:ext cx="5977114" cy="4631082"/>
-          </a:xfrm>
-          <a:prstGeom prst="rect">
-            <a:avLst/>
-          </a:prstGeom>
         </p:spPr>
         <p:style>
           <a:lnRef idx="2">
@@ -24348,90 +23370,76 @@
           <a:bodyPr rtlCol="0" anchor="ctr"/>
           <a:lstStyle/>
           <a:p>
-            <a:pPr algn="ctr"/>
-            <a:r>
-              <a:rPr lang="fr-FR" dirty="0"/>
-              <a:t>Créer un indicateur + rajouter dans le dashboard</a:t>
-            </a:r>
-          </a:p>
-          <a:p>
-            <a:pPr marL="285750" indent="-285750" algn="ctr">
-              <a:buFontTx/>
-              <a:buChar char="-"/>
-            </a:pPr>
-            <a:r>
-              <a:rPr lang="fr-FR" dirty="0"/>
-              <a:t>Proba client, à partir de ça on peut se dire qu’un crédit réussi à 3% de 3000 euros</a:t>
-            </a:r>
-          </a:p>
-          <a:p>
-            <a:pPr marL="285750" indent="-285750" algn="ctr">
-              <a:buFontTx/>
-              <a:buChar char="-"/>
-            </a:pPr>
-            <a:r>
-              <a:rPr lang="fr-FR" dirty="0"/>
-              <a:t>Un crédit qui </a:t>
-            </a:r>
-            <a:r>
-              <a:rPr lang="fr-FR" dirty="0" err="1"/>
-              <a:t>faile</a:t>
-            </a:r>
-            <a:endParaRPr lang="fr-FR" dirty="0"/>
-          </a:p>
-          <a:p>
-            <a:pPr marL="285750" indent="-285750" algn="ctr">
-              <a:buFontTx/>
-              <a:buChar char="-"/>
-            </a:pPr>
-            <a:r>
-              <a:rPr lang="fr-FR" dirty="0"/>
-              <a:t>Qu’est-ce qu’il se passe si je rejette un client par erreur</a:t>
-            </a:r>
-          </a:p>
-          <a:p>
-            <a:pPr marL="285750" indent="-285750" algn="ctr">
-              <a:buFontTx/>
-              <a:buChar char="-"/>
-            </a:pPr>
-            <a:r>
-              <a:rPr lang="fr-FR" dirty="0"/>
-              <a:t>Cout d’un crédit accepté qui va faire défaut, crédit non accepté qui ne va pas faire défaut</a:t>
-            </a:r>
-          </a:p>
-          <a:p>
-            <a:pPr marL="285750" indent="-285750" algn="ctr">
-              <a:buFontTx/>
-              <a:buChar char="-"/>
-            </a:pPr>
-            <a:r>
-              <a:rPr lang="fr-FR" dirty="0"/>
-              <a:t>Ou le mettre dans le dashboard aussi</a:t>
-            </a:r>
-          </a:p>
-          <a:p>
-            <a:pPr marL="285750" indent="-285750" algn="ctr">
-              <a:buFontTx/>
-              <a:buChar char="-"/>
-            </a:pPr>
-            <a:endParaRPr lang="fr-FR" dirty="0"/>
-          </a:p>
-          <a:p>
-            <a:pPr marL="285750" indent="-285750" algn="ctr">
-              <a:buFontTx/>
-              <a:buChar char="-"/>
-            </a:pPr>
-            <a:r>
-              <a:rPr lang="fr-FR" dirty="0"/>
-              <a:t>Base du crédit et son gain marginal, à partir de ça on sait combien on va gagner/perdre (taux x crédit ce qu’on gagne, le crédit pour ce qu’on perd)</a:t>
+            <a:r>
+              <a:rPr lang="fr-FR" sz="8800" dirty="0"/>
+              <a:t>	4. Conclusion</a:t>
+            </a:r>
+          </a:p>
+          <a:p>
+            <a:r>
+              <a:rPr lang="fr-FR" sz="4000" dirty="0"/>
+              <a:t>	Points d’amélioration possibles</a:t>
+            </a:r>
+          </a:p>
+          <a:p>
+            <a:r>
+              <a:rPr lang="fr-FR" sz="4000" dirty="0"/>
+              <a:t>	Q&amp;A</a:t>
+            </a:r>
+          </a:p>
+          <a:p>
+            <a:r>
+              <a:rPr lang="fr-FR" sz="4000" dirty="0"/>
+              <a:t>	</a:t>
             </a:r>
           </a:p>
         </p:txBody>
       </p:sp>
+      <p:cxnSp>
+        <p:nvCxnSpPr>
+          <p:cNvPr id="4" name="Connecteur droit 3">
+            <a:extLst>
+              <a:ext uri="{FF2B5EF4-FFF2-40B4-BE49-F238E27FC236}">
+                <a16:creationId xmlns:a16="http://schemas.microsoft.com/office/drawing/2014/main" id="{6628E5E9-8C81-4D31-A167-A0BD9A996233}"/>
+              </a:ext>
+            </a:extLst>
+          </p:cNvPr>
+          <p:cNvCxnSpPr/>
+          <p:nvPr/>
+        </p:nvCxnSpPr>
+        <p:spPr>
+          <a:xfrm>
+            <a:off x="284480" y="3098800"/>
+            <a:ext cx="11446828" cy="0"/>
+          </a:xfrm>
+          <a:prstGeom prst="line">
+            <a:avLst/>
+          </a:prstGeom>
+          <a:ln>
+            <a:solidFill>
+              <a:schemeClr val="bg1"/>
+            </a:solidFill>
+          </a:ln>
+        </p:spPr>
+        <p:style>
+          <a:lnRef idx="1">
+            <a:schemeClr val="accent1"/>
+          </a:lnRef>
+          <a:fillRef idx="0">
+            <a:schemeClr val="accent1"/>
+          </a:fillRef>
+          <a:effectRef idx="0">
+            <a:schemeClr val="accent1"/>
+          </a:effectRef>
+          <a:fontRef idx="minor">
+            <a:schemeClr val="tx1"/>
+          </a:fontRef>
+        </p:style>
+      </p:cxnSp>
     </p:spTree>
     <p:extLst>
       <p:ext uri="{BB962C8B-B14F-4D97-AF65-F5344CB8AC3E}">
-        <p14:creationId xmlns:p14="http://schemas.microsoft.com/office/powerpoint/2010/main" val="216155630"/>
+        <p14:creationId xmlns:p14="http://schemas.microsoft.com/office/powerpoint/2010/main" val="2511860389"/>
       </p:ext>
     </p:extLst>
   </p:cSld>
@@ -24458,6 +23466,437 @@
           <a:chExt cx="0" cy="0"/>
         </a:xfrm>
       </p:grpSpPr>
+      <p:graphicFrame>
+        <p:nvGraphicFramePr>
+          <p:cNvPr id="5" name="Objet 4" hidden="1">
+            <a:extLst>
+              <a:ext uri="{FF2B5EF4-FFF2-40B4-BE49-F238E27FC236}">
+                <a16:creationId xmlns:a16="http://schemas.microsoft.com/office/drawing/2014/main" id="{563ECDA8-3053-4B9E-8D6A-AAF5BC86A822}"/>
+              </a:ext>
+            </a:extLst>
+          </p:cNvPr>
+          <p:cNvGraphicFramePr>
+            <a:graphicFrameLocks noChangeAspect="1"/>
+          </p:cNvGraphicFramePr>
+          <p:nvPr>
+            <p:custDataLst>
+              <p:tags r:id="rId2"/>
+            </p:custDataLst>
+          </p:nvPr>
+        </p:nvGraphicFramePr>
+        <p:xfrm>
+          <a:off x="1588" y="1588"/>
+          <a:ext cx="1588" cy="1588"/>
+        </p:xfrm>
+        <a:graphic>
+          <a:graphicData uri="http://schemas.openxmlformats.org/presentationml/2006/ole">
+            <mc:AlternateContent xmlns:mc="http://schemas.openxmlformats.org/markup-compatibility/2006">
+              <mc:Choice xmlns:v="urn:schemas-microsoft-com:vml" Requires="v">
+                <p:oleObj spid="_x0000_s41996" name="Diapositive think-cell" r:id="rId4" imgW="415" imgH="416" progId="TCLayout.ActiveDocument.1">
+                  <p:embed/>
+                </p:oleObj>
+              </mc:Choice>
+              <mc:Fallback>
+                <p:oleObj name="Diapositive think-cell" r:id="rId4" imgW="415" imgH="416" progId="TCLayout.ActiveDocument.1">
+                  <p:embed/>
+                  <p:pic>
+                    <p:nvPicPr>
+                      <p:cNvPr id="5" name="Objet 4" hidden="1">
+                        <a:extLst>
+                          <a:ext uri="{FF2B5EF4-FFF2-40B4-BE49-F238E27FC236}">
+                            <a16:creationId xmlns:a16="http://schemas.microsoft.com/office/drawing/2014/main" id="{563ECDA8-3053-4B9E-8D6A-AAF5BC86A822}"/>
+                          </a:ext>
+                        </a:extLst>
+                      </p:cNvPr>
+                      <p:cNvPicPr/>
+                      <p:nvPr/>
+                    </p:nvPicPr>
+                    <p:blipFill>
+                      <a:blip r:embed="rId5"/>
+                      <a:stretch>
+                        <a:fillRect/>
+                      </a:stretch>
+                    </p:blipFill>
+                    <p:spPr>
+                      <a:xfrm>
+                        <a:off x="1588" y="1588"/>
+                        <a:ext cx="1588" cy="1588"/>
+                      </a:xfrm>
+                      <a:prstGeom prst="rect">
+                        <a:avLst/>
+                      </a:prstGeom>
+                    </p:spPr>
+                  </p:pic>
+                </p:oleObj>
+              </mc:Fallback>
+            </mc:AlternateContent>
+          </a:graphicData>
+        </a:graphic>
+      </p:graphicFrame>
+      <p:sp>
+        <p:nvSpPr>
+          <p:cNvPr id="34" name="Rectangle 33">
+            <a:extLst>
+              <a:ext uri="{FF2B5EF4-FFF2-40B4-BE49-F238E27FC236}">
+                <a16:creationId xmlns:a16="http://schemas.microsoft.com/office/drawing/2014/main" id="{86A52CCD-9959-43E4-90E1-14C68071D2EF}"/>
+              </a:ext>
+            </a:extLst>
+          </p:cNvPr>
+          <p:cNvSpPr>
+            <a:spLocks/>
+          </p:cNvSpPr>
+          <p:nvPr/>
+        </p:nvSpPr>
+        <p:spPr>
+          <a:xfrm>
+            <a:off x="-1546" y="0"/>
+            <a:ext cx="12193545" cy="544108"/>
+          </a:xfrm>
+          <a:prstGeom prst="rect">
+            <a:avLst/>
+          </a:prstGeom>
+          <a:solidFill>
+            <a:srgbClr val="D7D8D7"/>
+          </a:solidFill>
+          <a:ln>
+            <a:solidFill>
+              <a:srgbClr val="D7D8D7"/>
+            </a:solidFill>
+          </a:ln>
+        </p:spPr>
+        <p:style>
+          <a:lnRef idx="2">
+            <a:schemeClr val="accent1">
+              <a:shade val="50000"/>
+            </a:schemeClr>
+          </a:lnRef>
+          <a:fillRef idx="1">
+            <a:schemeClr val="accent1"/>
+          </a:fillRef>
+          <a:effectRef idx="0">
+            <a:schemeClr val="accent1"/>
+          </a:effectRef>
+          <a:fontRef idx="minor">
+            <a:schemeClr val="lt1"/>
+          </a:fontRef>
+        </p:style>
+        <p:txBody>
+          <a:bodyPr rtlCol="0" anchor="ctr"/>
+          <a:lstStyle/>
+          <a:p>
+            <a:pPr algn="ctr"/>
+            <a:endParaRPr lang="LID4096">
+              <a:uFillTx/>
+            </a:endParaRPr>
+          </a:p>
+        </p:txBody>
+      </p:sp>
+      <p:sp>
+        <p:nvSpPr>
+          <p:cNvPr id="70" name="Oval 21">
+            <a:extLst>
+              <a:ext uri="{FF2B5EF4-FFF2-40B4-BE49-F238E27FC236}">
+                <a16:creationId xmlns:a16="http://schemas.microsoft.com/office/drawing/2014/main" id="{21E00B41-C90D-4BDF-A077-C8F7B556C7BC}"/>
+              </a:ext>
+            </a:extLst>
+          </p:cNvPr>
+          <p:cNvSpPr>
+            <a:spLocks/>
+          </p:cNvSpPr>
+          <p:nvPr/>
+        </p:nvSpPr>
+        <p:spPr>
+          <a:xfrm>
+            <a:off x="4891314" y="-223688"/>
+            <a:ext cx="2409372" cy="1008000"/>
+          </a:xfrm>
+          <a:prstGeom prst="ellipse">
+            <a:avLst/>
+          </a:prstGeom>
+          <a:solidFill>
+            <a:srgbClr val="D7D8D7"/>
+          </a:solidFill>
+          <a:ln w="12700">
+            <a:solidFill>
+              <a:schemeClr val="bg1"/>
+            </a:solidFill>
+          </a:ln>
+          <a:effectLst>
+            <a:outerShdw blurRad="50800" dist="38100" dir="2700000" algn="tl" rotWithShape="0">
+              <a:srgbClr val="000000">
+                <a:alpha val="40000"/>
+              </a:srgbClr>
+            </a:outerShdw>
+          </a:effectLst>
+        </p:spPr>
+        <p:style>
+          <a:lnRef idx="2">
+            <a:schemeClr val="accent1">
+              <a:shade val="50000"/>
+            </a:schemeClr>
+          </a:lnRef>
+          <a:fillRef idx="1">
+            <a:schemeClr val="accent1"/>
+          </a:fillRef>
+          <a:effectRef idx="0">
+            <a:schemeClr val="accent1"/>
+          </a:effectRef>
+          <a:fontRef idx="minor">
+            <a:schemeClr val="lt1"/>
+          </a:fontRef>
+        </p:style>
+        <p:txBody>
+          <a:bodyPr rtlCol="0" anchor="ctr"/>
+          <a:lstStyle/>
+          <a:p>
+            <a:pPr algn="ctr"/>
+            <a:endParaRPr lang="LID4096" dirty="0">
+              <a:solidFill>
+                <a:srgbClr val="2A0068"/>
+              </a:solidFill>
+              <a:uFillTx/>
+              <a:latin typeface="Baloo" panose="03080902040302020200" pitchFamily="66" charset="0"/>
+              <a:cs typeface="Baloo" panose="03080902040302020200" pitchFamily="66" charset="0"/>
+            </a:endParaRPr>
+          </a:p>
+        </p:txBody>
+      </p:sp>
+      <p:sp>
+        <p:nvSpPr>
+          <p:cNvPr id="73" name="Rectangle 72">
+            <a:extLst>
+              <a:ext uri="{FF2B5EF4-FFF2-40B4-BE49-F238E27FC236}">
+                <a16:creationId xmlns:a16="http://schemas.microsoft.com/office/drawing/2014/main" id="{9F990D0F-3A28-4858-B939-D0DB6600268A}"/>
+              </a:ext>
+            </a:extLst>
+          </p:cNvPr>
+          <p:cNvSpPr>
+            <a:spLocks/>
+          </p:cNvSpPr>
+          <p:nvPr/>
+        </p:nvSpPr>
+        <p:spPr>
+          <a:xfrm>
+            <a:off x="4530058" y="-249582"/>
+            <a:ext cx="3131884" cy="783727"/>
+          </a:xfrm>
+          <a:prstGeom prst="rect">
+            <a:avLst/>
+          </a:prstGeom>
+          <a:solidFill>
+            <a:srgbClr val="D7D8D7"/>
+          </a:solidFill>
+          <a:ln>
+            <a:solidFill>
+              <a:srgbClr val="D7D8D7"/>
+            </a:solidFill>
+          </a:ln>
+        </p:spPr>
+        <p:style>
+          <a:lnRef idx="2">
+            <a:schemeClr val="accent1">
+              <a:shade val="50000"/>
+            </a:schemeClr>
+          </a:lnRef>
+          <a:fillRef idx="1">
+            <a:schemeClr val="accent1"/>
+          </a:fillRef>
+          <a:effectRef idx="0">
+            <a:schemeClr val="accent1"/>
+          </a:effectRef>
+          <a:fontRef idx="minor">
+            <a:schemeClr val="lt1"/>
+          </a:fontRef>
+        </p:style>
+        <p:txBody>
+          <a:bodyPr rtlCol="0" anchor="ctr"/>
+          <a:lstStyle/>
+          <a:p>
+            <a:pPr algn="ctr"/>
+            <a:endParaRPr lang="LID4096">
+              <a:uFillTx/>
+            </a:endParaRPr>
+          </a:p>
+        </p:txBody>
+      </p:sp>
+      <p:cxnSp>
+        <p:nvCxnSpPr>
+          <p:cNvPr id="74" name="Straight Connector 36">
+            <a:extLst>
+              <a:ext uri="{FF2B5EF4-FFF2-40B4-BE49-F238E27FC236}">
+                <a16:creationId xmlns:a16="http://schemas.microsoft.com/office/drawing/2014/main" id="{6AC8BA9A-5A95-442A-86B2-D6471C273567}"/>
+              </a:ext>
+            </a:extLst>
+          </p:cNvPr>
+          <p:cNvCxnSpPr/>
+          <p:nvPr/>
+        </p:nvCxnSpPr>
+        <p:spPr>
+          <a:xfrm>
+            <a:off x="4696733" y="190333"/>
+            <a:ext cx="0" cy="216000"/>
+          </a:xfrm>
+          <a:prstGeom prst="line">
+            <a:avLst/>
+          </a:prstGeom>
+          <a:ln>
+            <a:solidFill>
+              <a:schemeClr val="bg1">
+                <a:lumMod val="75000"/>
+              </a:schemeClr>
+            </a:solidFill>
+          </a:ln>
+        </p:spPr>
+        <p:style>
+          <a:lnRef idx="1">
+            <a:schemeClr val="accent1"/>
+          </a:lnRef>
+          <a:fillRef idx="0">
+            <a:schemeClr val="accent1"/>
+          </a:fillRef>
+          <a:effectRef idx="0">
+            <a:schemeClr val="accent1"/>
+          </a:effectRef>
+          <a:fontRef idx="minor">
+            <a:schemeClr val="tx1"/>
+          </a:fontRef>
+        </p:style>
+      </p:cxnSp>
+      <p:cxnSp>
+        <p:nvCxnSpPr>
+          <p:cNvPr id="75" name="Straight Connector 36">
+            <a:extLst>
+              <a:ext uri="{FF2B5EF4-FFF2-40B4-BE49-F238E27FC236}">
+                <a16:creationId xmlns:a16="http://schemas.microsoft.com/office/drawing/2014/main" id="{3F5750F7-3C85-48DA-BD57-0EB1C694D16F}"/>
+              </a:ext>
+            </a:extLst>
+          </p:cNvPr>
+          <p:cNvCxnSpPr/>
+          <p:nvPr/>
+        </p:nvCxnSpPr>
+        <p:spPr>
+          <a:xfrm>
+            <a:off x="2028856" y="197590"/>
+            <a:ext cx="0" cy="216000"/>
+          </a:xfrm>
+          <a:prstGeom prst="line">
+            <a:avLst/>
+          </a:prstGeom>
+          <a:ln>
+            <a:solidFill>
+              <a:schemeClr val="bg1">
+                <a:lumMod val="75000"/>
+              </a:schemeClr>
+            </a:solidFill>
+          </a:ln>
+        </p:spPr>
+        <p:style>
+          <a:lnRef idx="1">
+            <a:schemeClr val="accent1"/>
+          </a:lnRef>
+          <a:fillRef idx="0">
+            <a:schemeClr val="accent1"/>
+          </a:fillRef>
+          <a:effectRef idx="0">
+            <a:schemeClr val="accent1"/>
+          </a:effectRef>
+          <a:fontRef idx="minor">
+            <a:schemeClr val="tx1"/>
+          </a:fontRef>
+        </p:style>
+      </p:cxnSp>
+      <p:sp>
+        <p:nvSpPr>
+          <p:cNvPr id="79" name="TextBox 26">
+            <a:extLst>
+              <a:ext uri="{FF2B5EF4-FFF2-40B4-BE49-F238E27FC236}">
+                <a16:creationId xmlns:a16="http://schemas.microsoft.com/office/drawing/2014/main" id="{39F69F4E-3B4A-41B5-8C1D-64E9A4BC90EE}"/>
+              </a:ext>
+            </a:extLst>
+          </p:cNvPr>
+          <p:cNvSpPr txBox="1">
+            <a:spLocks/>
+          </p:cNvSpPr>
+          <p:nvPr/>
+        </p:nvSpPr>
+        <p:spPr>
+          <a:xfrm>
+            <a:off x="7287" y="142281"/>
+            <a:ext cx="2052000" cy="307777"/>
+          </a:xfrm>
+          <a:prstGeom prst="rect">
+            <a:avLst/>
+          </a:prstGeom>
+          <a:noFill/>
+          <a:ln>
+            <a:noFill/>
+          </a:ln>
+        </p:spPr>
+        <p:txBody>
+          <a:bodyPr wrap="square" rtlCol="0">
+            <a:spAutoFit/>
+          </a:bodyPr>
+          <a:lstStyle/>
+          <a:p>
+            <a:pPr algn="ctr"/>
+            <a:r>
+              <a:rPr lang="fr-FR" sz="1400" b="1" dirty="0">
+                <a:solidFill>
+                  <a:schemeClr val="accent3"/>
+                </a:solidFill>
+                <a:latin typeface="Trebuchet MS" panose="020B0603020202020204" pitchFamily="34" charset="0"/>
+              </a:rPr>
+              <a:t>CONTEXTE</a:t>
+            </a:r>
+          </a:p>
+        </p:txBody>
+      </p:sp>
+      <p:sp>
+        <p:nvSpPr>
+          <p:cNvPr id="81" name="TextBox 26">
+            <a:extLst>
+              <a:ext uri="{FF2B5EF4-FFF2-40B4-BE49-F238E27FC236}">
+                <a16:creationId xmlns:a16="http://schemas.microsoft.com/office/drawing/2014/main" id="{57D0B7C0-DC57-431F-8DD5-2F8B24747D09}"/>
+              </a:ext>
+            </a:extLst>
+          </p:cNvPr>
+          <p:cNvSpPr txBox="1">
+            <a:spLocks/>
+          </p:cNvSpPr>
+          <p:nvPr/>
+        </p:nvSpPr>
+        <p:spPr>
+          <a:xfrm>
+            <a:off x="2059287" y="146805"/>
+            <a:ext cx="2891751" cy="305940"/>
+          </a:xfrm>
+          <a:prstGeom prst="rect">
+            <a:avLst/>
+          </a:prstGeom>
+          <a:noFill/>
+          <a:ln>
+            <a:noFill/>
+          </a:ln>
+        </p:spPr>
+        <p:txBody>
+          <a:bodyPr wrap="square" rtlCol="0">
+            <a:spAutoFit/>
+          </a:bodyPr>
+          <a:lstStyle/>
+          <a:p>
+            <a:pPr algn="ctr"/>
+            <a:r>
+              <a:rPr lang="fr-FR" sz="1400" b="1" dirty="0">
+                <a:solidFill>
+                  <a:schemeClr val="accent3"/>
+                </a:solidFill>
+                <a:latin typeface="Trebuchet MS" panose="020B0603020202020204" pitchFamily="34" charset="0"/>
+              </a:rPr>
+              <a:t>MODÉLISATION</a:t>
+            </a:r>
+          </a:p>
+        </p:txBody>
+      </p:sp>
       <p:grpSp>
         <p:nvGrpSpPr>
           <p:cNvPr id="30" name="Groupe 29">
@@ -24680,6 +24119,722 @@
                   <a:defRPr/>
                 </a:pPr>
                 <a:t>22</a:t>
+              </a:fld>
+              <a:endParaRPr lang="fr-FR" sz="800" dirty="0">
+                <a:solidFill>
+                  <a:schemeClr val="bg1"/>
+                </a:solidFill>
+                <a:latin typeface="Baloo" panose="03080902040302020200" pitchFamily="66" charset="0"/>
+                <a:cs typeface="Baloo" panose="03080902040302020200" pitchFamily="66" charset="0"/>
+              </a:endParaRPr>
+            </a:p>
+          </p:txBody>
+        </p:sp>
+        <p:sp>
+          <p:nvSpPr>
+            <p:cNvPr id="33" name="Triangle rectangle 32">
+              <a:extLst>
+                <a:ext uri="{FF2B5EF4-FFF2-40B4-BE49-F238E27FC236}">
+                  <a16:creationId xmlns:a16="http://schemas.microsoft.com/office/drawing/2014/main" id="{BB222F89-35F0-4463-B2DD-04BCACC05AF5}"/>
+                </a:ext>
+              </a:extLst>
+            </p:cNvPr>
+            <p:cNvSpPr/>
+            <p:nvPr/>
+          </p:nvSpPr>
+          <p:spPr>
+            <a:xfrm rot="5400000">
+              <a:off x="11254545" y="6568737"/>
+              <a:ext cx="299720" cy="259186"/>
+            </a:xfrm>
+            <a:prstGeom prst="rtTriangle">
+              <a:avLst/>
+            </a:prstGeom>
+            <a:solidFill>
+              <a:schemeClr val="bg1"/>
+            </a:solidFill>
+            <a:ln>
+              <a:solidFill>
+                <a:schemeClr val="bg1"/>
+              </a:solidFill>
+            </a:ln>
+          </p:spPr>
+          <p:style>
+            <a:lnRef idx="2">
+              <a:schemeClr val="accent1">
+                <a:shade val="50000"/>
+              </a:schemeClr>
+            </a:lnRef>
+            <a:fillRef idx="1">
+              <a:schemeClr val="accent1"/>
+            </a:fillRef>
+            <a:effectRef idx="0">
+              <a:schemeClr val="accent1"/>
+            </a:effectRef>
+            <a:fontRef idx="minor">
+              <a:schemeClr val="lt1"/>
+            </a:fontRef>
+          </p:style>
+          <p:txBody>
+            <a:bodyPr rtlCol="0" anchor="ctr"/>
+            <a:lstStyle/>
+            <a:p>
+              <a:pPr algn="ctr"/>
+              <a:endParaRPr lang="fr-FR" dirty="0"/>
+            </a:p>
+          </p:txBody>
+        </p:sp>
+      </p:grpSp>
+      <p:pic>
+        <p:nvPicPr>
+          <p:cNvPr id="3" name="Image 2">
+            <a:extLst>
+              <a:ext uri="{FF2B5EF4-FFF2-40B4-BE49-F238E27FC236}">
+                <a16:creationId xmlns:a16="http://schemas.microsoft.com/office/drawing/2014/main" id="{7A389926-05FB-4C34-A31D-E1334EF99F46}"/>
+              </a:ext>
+            </a:extLst>
+          </p:cNvPr>
+          <p:cNvPicPr>
+            <a:picLocks noChangeAspect="1"/>
+          </p:cNvPicPr>
+          <p:nvPr/>
+        </p:nvPicPr>
+        <p:blipFill>
+          <a:blip r:embed="rId6"/>
+          <a:stretch>
+            <a:fillRect/>
+          </a:stretch>
+        </p:blipFill>
+        <p:spPr>
+          <a:xfrm>
+            <a:off x="4848447" y="0"/>
+            <a:ext cx="2524125" cy="495300"/>
+          </a:xfrm>
+          <a:prstGeom prst="rect">
+            <a:avLst/>
+          </a:prstGeom>
+        </p:spPr>
+      </p:pic>
+      <p:cxnSp>
+        <p:nvCxnSpPr>
+          <p:cNvPr id="71" name="Straight Connector 22">
+            <a:extLst>
+              <a:ext uri="{FF2B5EF4-FFF2-40B4-BE49-F238E27FC236}">
+                <a16:creationId xmlns:a16="http://schemas.microsoft.com/office/drawing/2014/main" id="{3E677F3D-C08E-49B3-BFF4-7E1553EE5144}"/>
+              </a:ext>
+            </a:extLst>
+          </p:cNvPr>
+          <p:cNvCxnSpPr>
+            <a:cxnSpLocks/>
+          </p:cNvCxnSpPr>
+          <p:nvPr/>
+        </p:nvCxnSpPr>
+        <p:spPr>
+          <a:xfrm>
+            <a:off x="-21590" y="548496"/>
+            <a:ext cx="5117779" cy="14365"/>
+          </a:xfrm>
+          <a:prstGeom prst="line">
+            <a:avLst/>
+          </a:prstGeom>
+          <a:ln w="12700">
+            <a:solidFill>
+              <a:schemeClr val="bg1"/>
+            </a:solidFill>
+          </a:ln>
+          <a:effectLst>
+            <a:outerShdw blurRad="50800" dist="38100" dir="2700000" algn="tl" rotWithShape="0">
+              <a:srgbClr val="000000">
+                <a:alpha val="40000"/>
+              </a:srgbClr>
+            </a:outerShdw>
+          </a:effectLst>
+        </p:spPr>
+        <p:style>
+          <a:lnRef idx="1">
+            <a:schemeClr val="accent1"/>
+          </a:lnRef>
+          <a:fillRef idx="0">
+            <a:schemeClr val="accent1"/>
+          </a:fillRef>
+          <a:effectRef idx="0">
+            <a:schemeClr val="accent1"/>
+          </a:effectRef>
+          <a:fontRef idx="minor">
+            <a:schemeClr val="tx1"/>
+          </a:fontRef>
+        </p:style>
+      </p:cxnSp>
+      <p:sp>
+        <p:nvSpPr>
+          <p:cNvPr id="22" name="Rectangle 21">
+            <a:extLst>
+              <a:ext uri="{FF2B5EF4-FFF2-40B4-BE49-F238E27FC236}">
+                <a16:creationId xmlns:a16="http://schemas.microsoft.com/office/drawing/2014/main" id="{B3E40F35-6F18-4795-94D0-0D751C6B0722}"/>
+              </a:ext>
+            </a:extLst>
+          </p:cNvPr>
+          <p:cNvSpPr/>
+          <p:nvPr/>
+        </p:nvSpPr>
+        <p:spPr>
+          <a:xfrm>
+            <a:off x="353226" y="892388"/>
+            <a:ext cx="11484000" cy="523220"/>
+          </a:xfrm>
+          <a:prstGeom prst="rect">
+            <a:avLst/>
+          </a:prstGeom>
+          <a:ln>
+            <a:noFill/>
+          </a:ln>
+        </p:spPr>
+        <p:txBody>
+          <a:bodyPr wrap="square">
+            <a:spAutoFit/>
+          </a:bodyPr>
+          <a:lstStyle/>
+          <a:p>
+            <a:r>
+              <a:rPr lang="fr-FR" sz="2800" b="1" dirty="0">
+                <a:solidFill>
+                  <a:srgbClr val="2A0068"/>
+                </a:solidFill>
+              </a:rPr>
+              <a:t>Points d’améliorations</a:t>
+            </a:r>
+          </a:p>
+        </p:txBody>
+      </p:sp>
+      <p:sp>
+        <p:nvSpPr>
+          <p:cNvPr id="40" name="TextBox 26">
+            <a:extLst>
+              <a:ext uri="{FF2B5EF4-FFF2-40B4-BE49-F238E27FC236}">
+                <a16:creationId xmlns:a16="http://schemas.microsoft.com/office/drawing/2014/main" id="{7F06B964-FE45-44D1-A532-BC3FA2FDC537}"/>
+              </a:ext>
+            </a:extLst>
+          </p:cNvPr>
+          <p:cNvSpPr txBox="1">
+            <a:spLocks/>
+          </p:cNvSpPr>
+          <p:nvPr/>
+        </p:nvSpPr>
+        <p:spPr>
+          <a:xfrm>
+            <a:off x="7424298" y="146062"/>
+            <a:ext cx="2664000" cy="307777"/>
+          </a:xfrm>
+          <a:prstGeom prst="rect">
+            <a:avLst/>
+          </a:prstGeom>
+          <a:noFill/>
+          <a:ln>
+            <a:noFill/>
+          </a:ln>
+        </p:spPr>
+        <p:txBody>
+          <a:bodyPr wrap="square" rtlCol="0">
+            <a:spAutoFit/>
+          </a:bodyPr>
+          <a:lstStyle/>
+          <a:p>
+            <a:pPr algn="ctr"/>
+            <a:r>
+              <a:rPr lang="fr-FR" sz="1400" b="1" dirty="0">
+                <a:solidFill>
+                  <a:srgbClr val="2A0068"/>
+                </a:solidFill>
+                <a:latin typeface="Trebuchet MS" panose="020B0603020202020204" pitchFamily="34" charset="0"/>
+              </a:rPr>
+              <a:t>DASHBOARD</a:t>
+            </a:r>
+          </a:p>
+        </p:txBody>
+      </p:sp>
+      <p:cxnSp>
+        <p:nvCxnSpPr>
+          <p:cNvPr id="41" name="Straight Connector 36">
+            <a:extLst>
+              <a:ext uri="{FF2B5EF4-FFF2-40B4-BE49-F238E27FC236}">
+                <a16:creationId xmlns:a16="http://schemas.microsoft.com/office/drawing/2014/main" id="{00C750FE-B05E-4CEA-853A-6B0B947ECC04}"/>
+              </a:ext>
+            </a:extLst>
+          </p:cNvPr>
+          <p:cNvCxnSpPr/>
+          <p:nvPr/>
+        </p:nvCxnSpPr>
+        <p:spPr>
+          <a:xfrm>
+            <a:off x="7536962" y="199069"/>
+            <a:ext cx="0" cy="216000"/>
+          </a:xfrm>
+          <a:prstGeom prst="line">
+            <a:avLst/>
+          </a:prstGeom>
+          <a:ln>
+            <a:solidFill>
+              <a:schemeClr val="bg1">
+                <a:lumMod val="75000"/>
+              </a:schemeClr>
+            </a:solidFill>
+          </a:ln>
+        </p:spPr>
+        <p:style>
+          <a:lnRef idx="1">
+            <a:schemeClr val="accent1"/>
+          </a:lnRef>
+          <a:fillRef idx="0">
+            <a:schemeClr val="accent1"/>
+          </a:fillRef>
+          <a:effectRef idx="0">
+            <a:schemeClr val="accent1"/>
+          </a:effectRef>
+          <a:fontRef idx="minor">
+            <a:schemeClr val="tx1"/>
+          </a:fontRef>
+        </p:style>
+      </p:cxnSp>
+      <p:sp>
+        <p:nvSpPr>
+          <p:cNvPr id="42" name="TextBox 26">
+            <a:extLst>
+              <a:ext uri="{FF2B5EF4-FFF2-40B4-BE49-F238E27FC236}">
+                <a16:creationId xmlns:a16="http://schemas.microsoft.com/office/drawing/2014/main" id="{FE588524-D155-4A00-A514-94869C5E5025}"/>
+              </a:ext>
+            </a:extLst>
+          </p:cNvPr>
+          <p:cNvSpPr txBox="1">
+            <a:spLocks/>
+          </p:cNvSpPr>
+          <p:nvPr/>
+        </p:nvSpPr>
+        <p:spPr>
+          <a:xfrm>
+            <a:off x="10103603" y="144968"/>
+            <a:ext cx="2052000" cy="307777"/>
+          </a:xfrm>
+          <a:prstGeom prst="rect">
+            <a:avLst/>
+          </a:prstGeom>
+          <a:noFill/>
+          <a:ln>
+            <a:noFill/>
+          </a:ln>
+        </p:spPr>
+        <p:txBody>
+          <a:bodyPr wrap="square" rtlCol="0">
+            <a:spAutoFit/>
+          </a:bodyPr>
+          <a:lstStyle/>
+          <a:p>
+            <a:pPr algn="ctr"/>
+            <a:r>
+              <a:rPr lang="fr-FR" sz="1400" b="1" dirty="0">
+                <a:solidFill>
+                  <a:schemeClr val="accent3"/>
+                </a:solidFill>
+                <a:latin typeface="Trebuchet MS" panose="020B0603020202020204" pitchFamily="34" charset="0"/>
+              </a:rPr>
+              <a:t>CONCLUSION / Q&amp;A</a:t>
+            </a:r>
+          </a:p>
+        </p:txBody>
+      </p:sp>
+      <p:cxnSp>
+        <p:nvCxnSpPr>
+          <p:cNvPr id="43" name="Straight Connector 36">
+            <a:extLst>
+              <a:ext uri="{FF2B5EF4-FFF2-40B4-BE49-F238E27FC236}">
+                <a16:creationId xmlns:a16="http://schemas.microsoft.com/office/drawing/2014/main" id="{7718A675-293C-49B9-8796-EB7B4B00B458}"/>
+              </a:ext>
+            </a:extLst>
+          </p:cNvPr>
+          <p:cNvCxnSpPr/>
+          <p:nvPr/>
+        </p:nvCxnSpPr>
+        <p:spPr>
+          <a:xfrm>
+            <a:off x="10081246" y="197450"/>
+            <a:ext cx="0" cy="216000"/>
+          </a:xfrm>
+          <a:prstGeom prst="line">
+            <a:avLst/>
+          </a:prstGeom>
+          <a:ln>
+            <a:solidFill>
+              <a:schemeClr val="bg1">
+                <a:lumMod val="75000"/>
+              </a:schemeClr>
+            </a:solidFill>
+          </a:ln>
+        </p:spPr>
+        <p:style>
+          <a:lnRef idx="1">
+            <a:schemeClr val="accent1"/>
+          </a:lnRef>
+          <a:fillRef idx="0">
+            <a:schemeClr val="accent1"/>
+          </a:fillRef>
+          <a:effectRef idx="0">
+            <a:schemeClr val="accent1"/>
+          </a:effectRef>
+          <a:fontRef idx="minor">
+            <a:schemeClr val="tx1"/>
+          </a:fontRef>
+        </p:style>
+      </p:cxnSp>
+      <p:cxnSp>
+        <p:nvCxnSpPr>
+          <p:cNvPr id="44" name="Straight Connector 23">
+            <a:extLst>
+              <a:ext uri="{FF2B5EF4-FFF2-40B4-BE49-F238E27FC236}">
+                <a16:creationId xmlns:a16="http://schemas.microsoft.com/office/drawing/2014/main" id="{BF677A9E-33AD-4749-AA81-4DFE76D51288}"/>
+              </a:ext>
+            </a:extLst>
+          </p:cNvPr>
+          <p:cNvCxnSpPr>
+            <a:cxnSpLocks/>
+          </p:cNvCxnSpPr>
+          <p:nvPr/>
+        </p:nvCxnSpPr>
+        <p:spPr>
+          <a:xfrm flipV="1">
+            <a:off x="7103948" y="540993"/>
+            <a:ext cx="5118532" cy="11708"/>
+          </a:xfrm>
+          <a:prstGeom prst="line">
+            <a:avLst/>
+          </a:prstGeom>
+          <a:ln w="12700">
+            <a:solidFill>
+              <a:schemeClr val="bg1"/>
+            </a:solidFill>
+          </a:ln>
+          <a:effectLst>
+            <a:outerShdw blurRad="50800" dist="38100" dir="2700000" algn="tl" rotWithShape="0">
+              <a:srgbClr val="000000">
+                <a:alpha val="40000"/>
+              </a:srgbClr>
+            </a:outerShdw>
+          </a:effectLst>
+        </p:spPr>
+        <p:style>
+          <a:lnRef idx="1">
+            <a:schemeClr val="accent1"/>
+          </a:lnRef>
+          <a:fillRef idx="0">
+            <a:schemeClr val="accent1"/>
+          </a:fillRef>
+          <a:effectRef idx="0">
+            <a:schemeClr val="accent1"/>
+          </a:effectRef>
+          <a:fontRef idx="minor">
+            <a:schemeClr val="tx1"/>
+          </a:fontRef>
+        </p:style>
+      </p:cxnSp>
+      <p:sp>
+        <p:nvSpPr>
+          <p:cNvPr id="2" name="Rectangle 1">
+            <a:extLst>
+              <a:ext uri="{FF2B5EF4-FFF2-40B4-BE49-F238E27FC236}">
+                <a16:creationId xmlns:a16="http://schemas.microsoft.com/office/drawing/2014/main" id="{517199F0-F3C8-4796-B1FA-70219AD8A46C}"/>
+              </a:ext>
+            </a:extLst>
+          </p:cNvPr>
+          <p:cNvSpPr/>
+          <p:nvPr/>
+        </p:nvSpPr>
+        <p:spPr>
+          <a:xfrm>
+            <a:off x="1177457" y="2507451"/>
+            <a:ext cx="4917769" cy="2293937"/>
+          </a:xfrm>
+          <a:prstGeom prst="rect">
+            <a:avLst/>
+          </a:prstGeom>
+        </p:spPr>
+        <p:style>
+          <a:lnRef idx="2">
+            <a:schemeClr val="accent1">
+              <a:shade val="50000"/>
+            </a:schemeClr>
+          </a:lnRef>
+          <a:fillRef idx="1">
+            <a:schemeClr val="accent1"/>
+          </a:fillRef>
+          <a:effectRef idx="0">
+            <a:schemeClr val="accent1"/>
+          </a:effectRef>
+          <a:fontRef idx="minor">
+            <a:schemeClr val="lt1"/>
+          </a:fontRef>
+        </p:style>
+        <p:txBody>
+          <a:bodyPr rtlCol="0" anchor="ctr"/>
+          <a:lstStyle/>
+          <a:p>
+            <a:pPr algn="ctr"/>
+            <a:r>
+              <a:rPr lang="fr-FR" dirty="0"/>
+              <a:t>A faire à partir de la note méthodo</a:t>
+            </a:r>
+          </a:p>
+        </p:txBody>
+      </p:sp>
+    </p:spTree>
+    <p:extLst>
+      <p:ext uri="{BB962C8B-B14F-4D97-AF65-F5344CB8AC3E}">
+        <p14:creationId xmlns:p14="http://schemas.microsoft.com/office/powerpoint/2010/main" val="216155630"/>
+      </p:ext>
+    </p:extLst>
+  </p:cSld>
+  <p:clrMapOvr>
+    <a:masterClrMapping/>
+  </p:clrMapOvr>
+</p:sld>
+</file>
+
+<file path=ppt/slides/slide23.xml><?xml version="1.0" encoding="utf-8"?>
+<p:sld xmlns:a="http://schemas.openxmlformats.org/drawingml/2006/main" xmlns:r="http://schemas.openxmlformats.org/officeDocument/2006/relationships" xmlns:p="http://schemas.openxmlformats.org/presentationml/2006/main">
+  <p:cSld>
+    <p:spTree>
+      <p:nvGrpSpPr>
+        <p:cNvPr id="1" name=""/>
+        <p:cNvGrpSpPr/>
+        <p:nvPr/>
+      </p:nvGrpSpPr>
+      <p:grpSpPr>
+        <a:xfrm>
+          <a:off x="0" y="0"/>
+          <a:ext cx="0" cy="0"/>
+          <a:chOff x="0" y="0"/>
+          <a:chExt cx="0" cy="0"/>
+        </a:xfrm>
+      </p:grpSpPr>
+      <p:grpSp>
+        <p:nvGrpSpPr>
+          <p:cNvPr id="30" name="Groupe 29">
+            <a:extLst>
+              <a:ext uri="{FF2B5EF4-FFF2-40B4-BE49-F238E27FC236}">
+                <a16:creationId xmlns:a16="http://schemas.microsoft.com/office/drawing/2014/main" id="{59BC9850-3059-4197-89D4-2CFAB90549F4}"/>
+              </a:ext>
+            </a:extLst>
+          </p:cNvPr>
+          <p:cNvGrpSpPr/>
+          <p:nvPr/>
+        </p:nvGrpSpPr>
+        <p:grpSpPr>
+          <a:xfrm>
+            <a:off x="11274812" y="6548470"/>
+            <a:ext cx="912993" cy="305335"/>
+            <a:chOff x="11274812" y="6548470"/>
+            <a:chExt cx="912993" cy="305335"/>
+          </a:xfrm>
+        </p:grpSpPr>
+        <p:sp>
+          <p:nvSpPr>
+            <p:cNvPr id="31" name="Rectangle 30">
+              <a:extLst>
+                <a:ext uri="{FF2B5EF4-FFF2-40B4-BE49-F238E27FC236}">
+                  <a16:creationId xmlns:a16="http://schemas.microsoft.com/office/drawing/2014/main" id="{AEF1AEA9-D638-41F3-AA23-74E14CCF2900}"/>
+                </a:ext>
+              </a:extLst>
+            </p:cNvPr>
+            <p:cNvSpPr/>
+            <p:nvPr/>
+          </p:nvSpPr>
+          <p:spPr>
+            <a:xfrm>
+              <a:off x="11278998" y="6597836"/>
+              <a:ext cx="908807" cy="255969"/>
+            </a:xfrm>
+            <a:prstGeom prst="rect">
+              <a:avLst/>
+            </a:prstGeom>
+            <a:solidFill>
+              <a:srgbClr val="2A0068"/>
+            </a:solidFill>
+            <a:ln>
+              <a:solidFill>
+                <a:srgbClr val="2A0068"/>
+              </a:solidFill>
+            </a:ln>
+          </p:spPr>
+          <p:style>
+            <a:lnRef idx="2">
+              <a:schemeClr val="accent1">
+                <a:shade val="50000"/>
+              </a:schemeClr>
+            </a:lnRef>
+            <a:fillRef idx="1">
+              <a:schemeClr val="accent1"/>
+            </a:fillRef>
+            <a:effectRef idx="0">
+              <a:schemeClr val="accent1"/>
+            </a:effectRef>
+            <a:fontRef idx="minor">
+              <a:schemeClr val="lt1"/>
+            </a:fontRef>
+          </p:style>
+          <p:txBody>
+            <a:bodyPr rtlCol="0" anchor="ctr"/>
+            <a:lstStyle/>
+            <a:p>
+              <a:pPr algn="ctr"/>
+              <a:endParaRPr lang="fr-FR" dirty="0"/>
+            </a:p>
+          </p:txBody>
+        </p:sp>
+        <p:sp>
+          <p:nvSpPr>
+            <p:cNvPr id="32" name="Espace réservé du numéro de diapositive 3">
+              <a:extLst>
+                <a:ext uri="{FF2B5EF4-FFF2-40B4-BE49-F238E27FC236}">
+                  <a16:creationId xmlns:a16="http://schemas.microsoft.com/office/drawing/2014/main" id="{62A0FAC1-C455-41C2-9D82-004C66A15279}"/>
+                </a:ext>
+              </a:extLst>
+            </p:cNvPr>
+            <p:cNvSpPr txBox="1">
+              <a:spLocks/>
+            </p:cNvSpPr>
+            <p:nvPr/>
+          </p:nvSpPr>
+          <p:spPr>
+            <a:xfrm>
+              <a:off x="11341920" y="6642995"/>
+              <a:ext cx="778777" cy="179917"/>
+            </a:xfrm>
+            <a:prstGeom prst="rect">
+              <a:avLst/>
+            </a:prstGeom>
+          </p:spPr>
+          <p:txBody>
+            <a:bodyPr vert="horz" lIns="91440" tIns="45720" rIns="91440" bIns="45720" rtlCol="0" anchor="ctr"/>
+            <a:lstStyle>
+              <a:defPPr>
+                <a:defRPr lang="fr-FR"/>
+              </a:defPPr>
+              <a:lvl1pPr marL="0" algn="r" defTabSz="914400" rtl="0" eaLnBrk="1" latinLnBrk="0" hangingPunct="1">
+                <a:defRPr sz="1200" kern="1200">
+                  <a:solidFill>
+                    <a:schemeClr val="tx1">
+                      <a:tint val="75000"/>
+                    </a:schemeClr>
+                  </a:solidFill>
+                  <a:latin typeface="+mn-lt"/>
+                  <a:ea typeface="+mn-ea"/>
+                  <a:cs typeface="+mn-cs"/>
+                </a:defRPr>
+              </a:lvl1pPr>
+              <a:lvl2pPr marL="457200" algn="l" defTabSz="914400" rtl="0" eaLnBrk="1" latinLnBrk="0" hangingPunct="1">
+                <a:defRPr sz="1800" kern="1200">
+                  <a:solidFill>
+                    <a:schemeClr val="tx1"/>
+                  </a:solidFill>
+                  <a:latin typeface="+mn-lt"/>
+                  <a:ea typeface="+mn-ea"/>
+                  <a:cs typeface="+mn-cs"/>
+                </a:defRPr>
+              </a:lvl2pPr>
+              <a:lvl3pPr marL="914400" algn="l" defTabSz="914400" rtl="0" eaLnBrk="1" latinLnBrk="0" hangingPunct="1">
+                <a:defRPr sz="1800" kern="1200">
+                  <a:solidFill>
+                    <a:schemeClr val="tx1"/>
+                  </a:solidFill>
+                  <a:latin typeface="+mn-lt"/>
+                  <a:ea typeface="+mn-ea"/>
+                  <a:cs typeface="+mn-cs"/>
+                </a:defRPr>
+              </a:lvl3pPr>
+              <a:lvl4pPr marL="1371600" algn="l" defTabSz="914400" rtl="0" eaLnBrk="1" latinLnBrk="0" hangingPunct="1">
+                <a:defRPr sz="1800" kern="1200">
+                  <a:solidFill>
+                    <a:schemeClr val="tx1"/>
+                  </a:solidFill>
+                  <a:latin typeface="+mn-lt"/>
+                  <a:ea typeface="+mn-ea"/>
+                  <a:cs typeface="+mn-cs"/>
+                </a:defRPr>
+              </a:lvl4pPr>
+              <a:lvl5pPr marL="1828800" algn="l" defTabSz="914400" rtl="0" eaLnBrk="1" latinLnBrk="0" hangingPunct="1">
+                <a:defRPr sz="1800" kern="1200">
+                  <a:solidFill>
+                    <a:schemeClr val="tx1"/>
+                  </a:solidFill>
+                  <a:latin typeface="+mn-lt"/>
+                  <a:ea typeface="+mn-ea"/>
+                  <a:cs typeface="+mn-cs"/>
+                </a:defRPr>
+              </a:lvl5pPr>
+              <a:lvl6pPr marL="2286000" algn="l" defTabSz="914400" rtl="0" eaLnBrk="1" latinLnBrk="0" hangingPunct="1">
+                <a:defRPr sz="1800" kern="1200">
+                  <a:solidFill>
+                    <a:schemeClr val="tx1"/>
+                  </a:solidFill>
+                  <a:latin typeface="+mn-lt"/>
+                  <a:ea typeface="+mn-ea"/>
+                  <a:cs typeface="+mn-cs"/>
+                </a:defRPr>
+              </a:lvl6pPr>
+              <a:lvl7pPr marL="2743200" algn="l" defTabSz="914400" rtl="0" eaLnBrk="1" latinLnBrk="0" hangingPunct="1">
+                <a:defRPr sz="1800" kern="1200">
+                  <a:solidFill>
+                    <a:schemeClr val="tx1"/>
+                  </a:solidFill>
+                  <a:latin typeface="+mn-lt"/>
+                  <a:ea typeface="+mn-ea"/>
+                  <a:cs typeface="+mn-cs"/>
+                </a:defRPr>
+              </a:lvl7pPr>
+              <a:lvl8pPr marL="3200400" algn="l" defTabSz="914400" rtl="0" eaLnBrk="1" latinLnBrk="0" hangingPunct="1">
+                <a:defRPr sz="1800" kern="1200">
+                  <a:solidFill>
+                    <a:schemeClr val="tx1"/>
+                  </a:solidFill>
+                  <a:latin typeface="+mn-lt"/>
+                  <a:ea typeface="+mn-ea"/>
+                  <a:cs typeface="+mn-cs"/>
+                </a:defRPr>
+              </a:lvl8pPr>
+              <a:lvl9pPr marL="3657600" algn="l" defTabSz="914400" rtl="0" eaLnBrk="1" latinLnBrk="0" hangingPunct="1">
+                <a:defRPr sz="1800" kern="1200">
+                  <a:solidFill>
+                    <a:schemeClr val="tx1"/>
+                  </a:solidFill>
+                  <a:latin typeface="+mn-lt"/>
+                  <a:ea typeface="+mn-ea"/>
+                  <a:cs typeface="+mn-cs"/>
+                </a:defRPr>
+              </a:lvl9pPr>
+            </a:lstStyle>
+            <a:p>
+              <a:pPr>
+                <a:defRPr/>
+              </a:pPr>
+              <a:r>
+                <a:rPr lang="fr-FR" sz="800" dirty="0">
+                  <a:solidFill>
+                    <a:schemeClr val="bg1"/>
+                  </a:solidFill>
+                  <a:latin typeface="Baloo" panose="03080902040302020200" pitchFamily="66" charset="0"/>
+                  <a:cs typeface="Baloo" panose="03080902040302020200" pitchFamily="66" charset="0"/>
+                </a:rPr>
+                <a:t>PAGE </a:t>
+              </a:r>
+              <a:fld id="{111E0755-5AAA-45F3-A07E-A05D57A9C10E}" type="slidenum">
+                <a:rPr lang="fr-FR" sz="800" smtClean="0">
+                  <a:solidFill>
+                    <a:schemeClr val="bg1"/>
+                  </a:solidFill>
+                  <a:latin typeface="Baloo" panose="03080902040302020200" pitchFamily="66" charset="0"/>
+                  <a:cs typeface="Baloo" panose="03080902040302020200" pitchFamily="66" charset="0"/>
+                </a:rPr>
+                <a:pPr>
+                  <a:defRPr/>
+                </a:pPr>
+                <a:t>23</a:t>
               </a:fld>
               <a:endParaRPr lang="fr-FR" sz="800" dirty="0">
                 <a:solidFill>
@@ -25971,7 +26126,7 @@
           <a:graphicData uri="http://schemas.openxmlformats.org/presentationml/2006/ole">
             <mc:AlternateContent xmlns:mc="http://schemas.openxmlformats.org/markup-compatibility/2006">
               <mc:Choice xmlns:v="urn:schemas-microsoft-com:vml" Requires="v">
-                <p:oleObj spid="_x0000_s2095" name="Diapositive think-cell" r:id="rId4" imgW="415" imgH="416" progId="TCLayout.ActiveDocument.1">
+                <p:oleObj spid="_x0000_s2100" name="Diapositive think-cell" r:id="rId4" imgW="415" imgH="416" progId="TCLayout.ActiveDocument.1">
                   <p:embed/>
                 </p:oleObj>
               </mc:Choice>
@@ -28067,7 +28222,7 @@
           <a:graphicData uri="http://schemas.openxmlformats.org/presentationml/2006/ole">
             <mc:AlternateContent xmlns:mc="http://schemas.openxmlformats.org/markup-compatibility/2006">
               <mc:Choice xmlns:v="urn:schemas-microsoft-com:vml" Requires="v">
-                <p:oleObj spid="_x0000_s29729" name="Diapositive think-cell" r:id="rId4" imgW="415" imgH="416" progId="TCLayout.ActiveDocument.1">
+                <p:oleObj spid="_x0000_s29734" name="Diapositive think-cell" r:id="rId4" imgW="415" imgH="416" progId="TCLayout.ActiveDocument.1">
                   <p:embed/>
                 </p:oleObj>
               </mc:Choice>
@@ -29345,7 +29500,7 @@
           <a:graphicData uri="http://schemas.openxmlformats.org/presentationml/2006/ole">
             <mc:AlternateContent xmlns:mc="http://schemas.openxmlformats.org/markup-compatibility/2006">
               <mc:Choice xmlns:v="urn:schemas-microsoft-com:vml" Requires="v">
-                <p:oleObj spid="_x0000_s30752" name="Diapositive think-cell" r:id="rId4" imgW="415" imgH="416" progId="TCLayout.ActiveDocument.1">
+                <p:oleObj spid="_x0000_s30758" name="Diapositive think-cell" r:id="rId4" imgW="415" imgH="416" progId="TCLayout.ActiveDocument.1">
                   <p:embed/>
                 </p:oleObj>
               </mc:Choice>
@@ -30352,7 +30507,7 @@
                   <a:srgbClr val="2A0068"/>
                 </a:solidFill>
               </a:rPr>
-              <a:t>Traitement des colonnes avec un </a:t>
+              <a:t>Suppression des colonnes avec un </a:t>
             </a:r>
             <a:r>
               <a:rPr lang="fr-FR" sz="2000" b="1" dirty="0">
@@ -31598,7 +31753,7 @@
           <a:graphicData uri="http://schemas.openxmlformats.org/presentationml/2006/ole">
             <mc:AlternateContent xmlns:mc="http://schemas.openxmlformats.org/markup-compatibility/2006">
               <mc:Choice xmlns:v="urn:schemas-microsoft-com:vml" Requires="v">
-                <p:oleObj spid="_x0000_s31776" name="Diapositive think-cell" r:id="rId4" imgW="415" imgH="416" progId="TCLayout.ActiveDocument.1">
+                <p:oleObj spid="_x0000_s31781" name="Diapositive think-cell" r:id="rId4" imgW="415" imgH="416" progId="TCLayout.ActiveDocument.1">
                   <p:embed/>
                 </p:oleObj>
               </mc:Choice>
@@ -33444,7 +33599,7 @@
           <a:graphicData uri="http://schemas.openxmlformats.org/presentationml/2006/ole">
             <mc:AlternateContent xmlns:mc="http://schemas.openxmlformats.org/markup-compatibility/2006">
               <mc:Choice xmlns:v="urn:schemas-microsoft-com:vml" Requires="v">
-                <p:oleObj spid="_x0000_s32804" name="Diapositive think-cell" r:id="rId4" imgW="415" imgH="416" progId="TCLayout.ActiveDocument.1">
+                <p:oleObj spid="_x0000_s32810" name="Diapositive think-cell" r:id="rId4" imgW="415" imgH="416" progId="TCLayout.ActiveDocument.1">
                   <p:embed/>
                 </p:oleObj>
               </mc:Choice>
@@ -35018,32 +35173,13 @@
                   <a:srgbClr val="2A0068"/>
                 </a:solidFill>
               </a:rPr>
-              <a:t>Dupliquer des individus sous-représentés </a:t>
-            </a:r>
-            <a:r>
-              <a:rPr lang="fr-FR" sz="1800" dirty="0">
-                <a:solidFill>
-                  <a:srgbClr val="2A0068"/>
-                </a:solidFill>
-              </a:rPr>
-              <a:t>(ici </a:t>
-            </a:r>
-            <a:r>
-              <a:rPr lang="fr-FR" dirty="0">
-                <a:solidFill>
-                  <a:srgbClr val="2A0068"/>
-                </a:solidFill>
-              </a:rPr>
-              <a:t>dans la </a:t>
-            </a:r>
-            <a:r>
-              <a:rPr lang="fr-FR" sz="1800" dirty="0">
-                <a:solidFill>
-                  <a:srgbClr val="2A0068"/>
-                </a:solidFill>
-              </a:rPr>
-              <a:t>classe minoritaire)</a:t>
-            </a:r>
+              <a:t>Dupliquer les individus sous-représentés</a:t>
+            </a:r>
+            <a:endParaRPr lang="fr-FR" sz="1800" dirty="0">
+              <a:solidFill>
+                <a:srgbClr val="2A0068"/>
+              </a:solidFill>
+            </a:endParaRPr>
           </a:p>
         </p:txBody>
       </p:sp>
@@ -35185,12 +35321,20 @@
               <a:buChar char="•"/>
             </a:pPr>
             <a:r>
+              <a:rPr lang="fr-FR" sz="1800" b="1" dirty="0">
+                <a:solidFill>
+                  <a:srgbClr val="2A0068"/>
+                </a:solidFill>
+              </a:rPr>
+              <a:t>Choisir </a:t>
+            </a:r>
+            <a:r>
               <a:rPr lang="fr-FR" sz="1800" dirty="0">
                 <a:solidFill>
                   <a:srgbClr val="2A0068"/>
                 </a:solidFill>
               </a:rPr>
-              <a:t>Choisir une </a:t>
+              <a:t>une </a:t>
             </a:r>
             <a:r>
               <a:rPr lang="fr-FR" sz="1800" b="1" dirty="0">
@@ -35199,6 +35343,20 @@
                 </a:solidFill>
               </a:rPr>
               <a:t>métrique de performance adaptée</a:t>
+            </a:r>
+          </a:p>
+          <a:p>
+            <a:pPr marL="185738" indent="-185738">
+              <a:buFont typeface="Arial" panose="020B0604020202020204" pitchFamily="34" charset="0"/>
+              <a:buChar char="•"/>
+            </a:pPr>
+            <a:r>
+              <a:rPr lang="fr-FR" sz="1600" i="1" dirty="0">
+                <a:solidFill>
+                  <a:srgbClr val="2A0068"/>
+                </a:solidFill>
+              </a:rPr>
+              <a:t>(expliqué plus loin dans la présentation) </a:t>
             </a:r>
           </a:p>
         </p:txBody>
@@ -35268,7 +35426,23 @@
                   <a:srgbClr val="2A0068"/>
                 </a:solidFill>
               </a:rPr>
-              <a:t>Pondération des observations</a:t>
+              <a:t>Pondérer </a:t>
+            </a:r>
+            <a:r>
+              <a:rPr lang="fr-FR" b="1" dirty="0">
+                <a:solidFill>
+                  <a:srgbClr val="2A0068"/>
+                </a:solidFill>
+              </a:rPr>
+              <a:t>les</a:t>
+            </a:r>
+            <a:r>
+              <a:rPr lang="fr-FR" sz="1800" b="1" dirty="0">
+                <a:solidFill>
+                  <a:srgbClr val="2A0068"/>
+                </a:solidFill>
+              </a:rPr>
+              <a:t> observations</a:t>
             </a:r>
             <a:r>
               <a:rPr lang="fr-FR" sz="1800" dirty="0">
@@ -35276,7 +35450,21 @@
                   <a:srgbClr val="2A0068"/>
                 </a:solidFill>
               </a:rPr>
-              <a:t> dans le training</a:t>
+              <a:t> dans le training </a:t>
+            </a:r>
+          </a:p>
+          <a:p>
+            <a:pPr marL="185738" indent="-185738">
+              <a:buFont typeface="Arial" panose="020B0604020202020204" pitchFamily="34" charset="0"/>
+              <a:buChar char="•"/>
+            </a:pPr>
+            <a:r>
+              <a:rPr lang="fr-FR" sz="1600" i="1" dirty="0">
+                <a:solidFill>
+                  <a:srgbClr val="2A0068"/>
+                </a:solidFill>
+              </a:rPr>
+              <a:t>(dans les hyperparamètres de nos algorithmes de ML)</a:t>
             </a:r>
           </a:p>
         </p:txBody>
@@ -35346,7 +35534,21 @@
                   <a:srgbClr val="2A0068"/>
                 </a:solidFill>
               </a:rPr>
-              <a:t>Création d’individus « synthétiques »</a:t>
+              <a:t>Créer des individus « synthétiques » </a:t>
+            </a:r>
+          </a:p>
+          <a:p>
+            <a:pPr marL="185738" indent="-185738">
+              <a:buFont typeface="Arial" panose="020B0604020202020204" pitchFamily="34" charset="0"/>
+              <a:buChar char="•"/>
+            </a:pPr>
+            <a:r>
+              <a:rPr lang="fr-FR" sz="1600" i="1" dirty="0">
+                <a:solidFill>
+                  <a:srgbClr val="2A0068"/>
+                </a:solidFill>
+              </a:rPr>
+              <a:t>(suréchantillonnage de minorité synthétique SMOTE)</a:t>
             </a:r>
           </a:p>
         </p:txBody>
@@ -35859,7 +36061,7 @@
         </p:nvSpPr>
         <p:spPr>
           <a:xfrm>
-            <a:off x="6301043" y="5091968"/>
+            <a:off x="6301043" y="5061488"/>
             <a:ext cx="324000" cy="324000"/>
           </a:xfrm>
           <a:prstGeom prst="ellipse">
@@ -35916,7 +36118,7 @@
         </p:nvSpPr>
         <p:spPr>
           <a:xfrm>
-            <a:off x="6297353" y="5658721"/>
+            <a:off x="6297353" y="5628241"/>
             <a:ext cx="324000" cy="324000"/>
           </a:xfrm>
           <a:prstGeom prst="ellipse">
@@ -36061,6 +36263,12 @@
 </file>
 
 <file path=ppt/tags/tag16.xml><?xml version="1.0" encoding="utf-8"?>
+<p:tagLst xmlns:a="http://schemas.openxmlformats.org/drawingml/2006/main" xmlns:r="http://schemas.openxmlformats.org/officeDocument/2006/relationships" xmlns:p="http://schemas.openxmlformats.org/presentationml/2006/main">
+  <p:tag name="THINKCELLSHAPEDONOTDELETE" val="thinkcellActiveDocDoNotDelete"/>
+</p:tagLst>
+</file>
+
+<file path=ppt/tags/tag17.xml><?xml version="1.0" encoding="utf-8"?>
 <p:tagLst xmlns:a="http://schemas.openxmlformats.org/drawingml/2006/main" xmlns:r="http://schemas.openxmlformats.org/officeDocument/2006/relationships" xmlns:p="http://schemas.openxmlformats.org/presentationml/2006/main">
   <p:tag name="THINKCELLSHAPEDONOTDELETE" val="thinkcellActiveDocDoNotDelete"/>
 </p:tagLst>
@@ -36410,12 +36618,6 @@
 </file>
 
 <file path=customXml/item1.xml><?xml version="1.0" encoding="utf-8"?>
-<p:properties xmlns:p="http://schemas.microsoft.com/office/2006/metadata/properties" xmlns:xsi="http://www.w3.org/2001/XMLSchema-instance" xmlns:pc="http://schemas.microsoft.com/office/infopath/2007/PartnerControls">
-  <documentManagement/>
-</p:properties>
-</file>
-
-<file path=customXml/item2.xml><?xml version="1.0" encoding="utf-8"?>
 <ct:contentTypeSchema xmlns:ct="http://schemas.microsoft.com/office/2006/metadata/contentType" xmlns:ma="http://schemas.microsoft.com/office/2006/metadata/properties/metaAttributes" ct:_="" ma:_="" ma:contentTypeName="Document" ma:contentTypeID="0x010100E08B85ABE125AF409A86B73326EFFAE5" ma:contentTypeVersion="13" ma:contentTypeDescription="Crée un document." ma:contentTypeScope="" ma:versionID="cfa2b84814ad0d4dc5902a099d18eada">
   <xsd:schema xmlns:xsd="http://www.w3.org/2001/XMLSchema" xmlns:xs="http://www.w3.org/2001/XMLSchema" xmlns:p="http://schemas.microsoft.com/office/2006/metadata/properties" xmlns:ns3="21c16e65-816f-4847-be88-731645291b21" xmlns:ns4="67c7d727-27e8-4526-a2a7-f89ba01a3409" targetNamespace="http://schemas.microsoft.com/office/2006/metadata/properties" ma:root="true" ma:fieldsID="1941e2dd5eb9c4a46146aa2eaafc37a7" ns3:_="" ns4:_="">
     <xsd:import namespace="21c16e65-816f-4847-be88-731645291b21"/>
@@ -36638,6 +36840,12 @@
 </ct:contentTypeSchema>
 </file>
 
+<file path=customXml/item2.xml><?xml version="1.0" encoding="utf-8"?>
+<p:properties xmlns:p="http://schemas.microsoft.com/office/2006/metadata/properties" xmlns:xsi="http://www.w3.org/2001/XMLSchema-instance" xmlns:pc="http://schemas.microsoft.com/office/infopath/2007/PartnerControls">
+  <documentManagement/>
+</p:properties>
+</file>
+
 <file path=customXml/item3.xml><?xml version="1.0" encoding="utf-8"?>
 <?mso-contentType ?>
 <FormTemplates xmlns="http://schemas.microsoft.com/sharepoint/v3/contenttype/forms">
@@ -36648,23 +36856,6 @@
 </file>
 
 <file path=customXml/itemProps1.xml><?xml version="1.0" encoding="utf-8"?>
-<ds:datastoreItem xmlns:ds="http://schemas.openxmlformats.org/officeDocument/2006/customXml" ds:itemID="{6DCF7537-AB6C-4566-9821-DCC4778AF944}">
-  <ds:schemaRefs>
-    <ds:schemaRef ds:uri="http://schemas.microsoft.com/office/2006/documentManagement/types"/>
-    <ds:schemaRef ds:uri="http://www.w3.org/XML/1998/namespace"/>
-    <ds:schemaRef ds:uri="http://purl.org/dc/dcmitype/"/>
-    <ds:schemaRef ds:uri="http://purl.org/dc/terms/"/>
-    <ds:schemaRef ds:uri="21c16e65-816f-4847-be88-731645291b21"/>
-    <ds:schemaRef ds:uri="http://purl.org/dc/elements/1.1/"/>
-    <ds:schemaRef ds:uri="http://schemas.microsoft.com/office/infopath/2007/PartnerControls"/>
-    <ds:schemaRef ds:uri="http://schemas.openxmlformats.org/package/2006/metadata/core-properties"/>
-    <ds:schemaRef ds:uri="67c7d727-27e8-4526-a2a7-f89ba01a3409"/>
-    <ds:schemaRef ds:uri="http://schemas.microsoft.com/office/2006/metadata/properties"/>
-  </ds:schemaRefs>
-</ds:datastoreItem>
-</file>
-
-<file path=customXml/itemProps2.xml><?xml version="1.0" encoding="utf-8"?>
 <ds:datastoreItem xmlns:ds="http://schemas.openxmlformats.org/officeDocument/2006/customXml" ds:itemID="{F4E0BA49-AB2A-4044-9F15-987E41C6A1BE}">
   <ds:schemaRefs>
     <ds:schemaRef ds:uri="http://schemas.microsoft.com/office/2006/metadata/contentType"/>
@@ -36683,6 +36874,23 @@
 </ds:datastoreItem>
 </file>
 
+<file path=customXml/itemProps2.xml><?xml version="1.0" encoding="utf-8"?>
+<ds:datastoreItem xmlns:ds="http://schemas.openxmlformats.org/officeDocument/2006/customXml" ds:itemID="{6DCF7537-AB6C-4566-9821-DCC4778AF944}">
+  <ds:schemaRefs>
+    <ds:schemaRef ds:uri="http://schemas.microsoft.com/office/2006/documentManagement/types"/>
+    <ds:schemaRef ds:uri="http://www.w3.org/XML/1998/namespace"/>
+    <ds:schemaRef ds:uri="http://purl.org/dc/dcmitype/"/>
+    <ds:schemaRef ds:uri="http://purl.org/dc/terms/"/>
+    <ds:schemaRef ds:uri="21c16e65-816f-4847-be88-731645291b21"/>
+    <ds:schemaRef ds:uri="http://purl.org/dc/elements/1.1/"/>
+    <ds:schemaRef ds:uri="http://schemas.microsoft.com/office/infopath/2007/PartnerControls"/>
+    <ds:schemaRef ds:uri="http://schemas.openxmlformats.org/package/2006/metadata/core-properties"/>
+    <ds:schemaRef ds:uri="67c7d727-27e8-4526-a2a7-f89ba01a3409"/>
+    <ds:schemaRef ds:uri="http://schemas.microsoft.com/office/2006/metadata/properties"/>
+  </ds:schemaRefs>
+</ds:datastoreItem>
+</file>
+
 <file path=customXml/itemProps3.xml><?xml version="1.0" encoding="utf-8"?>
 <ds:datastoreItem xmlns:ds="http://schemas.openxmlformats.org/officeDocument/2006/customXml" ds:itemID="{F8B2D13A-B571-47A0-B384-30EF6393E3B0}">
   <ds:schemaRefs>

</xml_diff>